<commit_message>
xử lý giải phóng bộ nhớ, bổ sung makefile.common, bổ sung constructor của addrspace
</commit_message>
<xml_diff>
--- a/Seminar_HDH_Project 2.pptx
+++ b/Seminar_HDH_Project 2.pptx
@@ -1,31 +1,31 @@
 
 <file path=ppt/presentation.xml><?xml version="1.0" encoding="utf-8"?>
-<p:presentation xmlns:a="http://schemas.openxmlformats.org/drawingml/2006/main" xmlns:r="http://schemas.openxmlformats.org/officeDocument/2006/relationships" xmlns:p="http://schemas.openxmlformats.org/presentationml/2006/main" saveSubsetFonts="1">
+<p:presentation xmlns:a="http://schemas.openxmlformats.org/drawingml/2006/main" xmlns:r="http://schemas.openxmlformats.org/officeDocument/2006/relationships" xmlns:p="http://schemas.openxmlformats.org/presentationml/2006/main">
   <p:sldMasterIdLst>
-    <p:sldMasterId id="2147483649" r:id="rId1"/>
+    <p:sldMasterId id="2147483648" r:id="rId1"/>
   </p:sldMasterIdLst>
   <p:notesMasterIdLst>
-    <p:notesMasterId r:id="rId20"/>
+    <p:notesMasterId r:id="rId4"/>
   </p:notesMasterIdLst>
   <p:sldIdLst>
-    <p:sldId id="256" r:id="rId2"/>
-    <p:sldId id="309" r:id="rId3"/>
-    <p:sldId id="312" r:id="rId4"/>
-    <p:sldId id="325" r:id="rId5"/>
-    <p:sldId id="344" r:id="rId6"/>
-    <p:sldId id="345" r:id="rId7"/>
-    <p:sldId id="346" r:id="rId8"/>
-    <p:sldId id="319" r:id="rId9"/>
-    <p:sldId id="347" r:id="rId10"/>
-    <p:sldId id="348" r:id="rId11"/>
-    <p:sldId id="349" r:id="rId12"/>
-    <p:sldId id="336" r:id="rId13"/>
-    <p:sldId id="337" r:id="rId14"/>
-    <p:sldId id="329" r:id="rId15"/>
-    <p:sldId id="341" r:id="rId16"/>
-    <p:sldId id="350" r:id="rId17"/>
-    <p:sldId id="351" r:id="rId18"/>
-    <p:sldId id="284" r:id="rId19"/>
+    <p:sldId id="256" r:id="rId3"/>
+    <p:sldId id="309" r:id="rId5"/>
+    <p:sldId id="312" r:id="rId6"/>
+    <p:sldId id="325" r:id="rId7"/>
+    <p:sldId id="344" r:id="rId8"/>
+    <p:sldId id="345" r:id="rId9"/>
+    <p:sldId id="346" r:id="rId10"/>
+    <p:sldId id="319" r:id="rId11"/>
+    <p:sldId id="347" r:id="rId12"/>
+    <p:sldId id="348" r:id="rId13"/>
+    <p:sldId id="349" r:id="rId14"/>
+    <p:sldId id="336" r:id="rId15"/>
+    <p:sldId id="337" r:id="rId16"/>
+    <p:sldId id="329" r:id="rId17"/>
+    <p:sldId id="341" r:id="rId18"/>
+    <p:sldId id="350" r:id="rId19"/>
+    <p:sldId id="351" r:id="rId20"/>
+    <p:sldId id="284" r:id="rId21"/>
   </p:sldIdLst>
   <p:sldSz cx="9144000" cy="6858000" type="screen4x3"/>
   <p:notesSz cx="6858000" cy="9144000"/>
@@ -44,7 +44,7 @@
         <a:solidFill>
           <a:schemeClr val="tx1"/>
         </a:solidFill>
-        <a:latin typeface="Arial" charset="0"/>
+        <a:latin typeface="Arial" panose="020B0604020202020204" pitchFamily="34" charset="0"/>
         <a:ea typeface="+mn-ea"/>
         <a:cs typeface="+mn-cs"/>
       </a:defRPr>
@@ -60,7 +60,7 @@
         <a:solidFill>
           <a:schemeClr val="tx1"/>
         </a:solidFill>
-        <a:latin typeface="Arial" charset="0"/>
+        <a:latin typeface="Arial" panose="020B0604020202020204" pitchFamily="34" charset="0"/>
         <a:ea typeface="+mn-ea"/>
         <a:cs typeface="+mn-cs"/>
       </a:defRPr>
@@ -76,7 +76,7 @@
         <a:solidFill>
           <a:schemeClr val="tx1"/>
         </a:solidFill>
-        <a:latin typeface="Arial" charset="0"/>
+        <a:latin typeface="Arial" panose="020B0604020202020204" pitchFamily="34" charset="0"/>
         <a:ea typeface="+mn-ea"/>
         <a:cs typeface="+mn-cs"/>
       </a:defRPr>
@@ -92,7 +92,7 @@
         <a:solidFill>
           <a:schemeClr val="tx1"/>
         </a:solidFill>
-        <a:latin typeface="Arial" charset="0"/>
+        <a:latin typeface="Arial" panose="020B0604020202020204" pitchFamily="34" charset="0"/>
         <a:ea typeface="+mn-ea"/>
         <a:cs typeface="+mn-cs"/>
       </a:defRPr>
@@ -108,7 +108,7 @@
         <a:solidFill>
           <a:schemeClr val="tx1"/>
         </a:solidFill>
-        <a:latin typeface="Arial" charset="0"/>
+        <a:latin typeface="Arial" panose="020B0604020202020204" pitchFamily="34" charset="0"/>
         <a:ea typeface="+mn-ea"/>
         <a:cs typeface="+mn-cs"/>
       </a:defRPr>
@@ -118,7 +118,7 @@
         <a:solidFill>
           <a:schemeClr val="tx1"/>
         </a:solidFill>
-        <a:latin typeface="Arial" charset="0"/>
+        <a:latin typeface="Arial" panose="020B0604020202020204" pitchFamily="34" charset="0"/>
         <a:ea typeface="+mn-ea"/>
         <a:cs typeface="+mn-cs"/>
       </a:defRPr>
@@ -128,7 +128,7 @@
         <a:solidFill>
           <a:schemeClr val="tx1"/>
         </a:solidFill>
-        <a:latin typeface="Arial" charset="0"/>
+        <a:latin typeface="Arial" panose="020B0604020202020204" pitchFamily="34" charset="0"/>
         <a:ea typeface="+mn-ea"/>
         <a:cs typeface="+mn-cs"/>
       </a:defRPr>
@@ -138,7 +138,7 @@
         <a:solidFill>
           <a:schemeClr val="tx1"/>
         </a:solidFill>
-        <a:latin typeface="Arial" charset="0"/>
+        <a:latin typeface="Arial" panose="020B0604020202020204" pitchFamily="34" charset="0"/>
         <a:ea typeface="+mn-ea"/>
         <a:cs typeface="+mn-cs"/>
       </a:defRPr>
@@ -148,28 +148,12 @@
         <a:solidFill>
           <a:schemeClr val="tx1"/>
         </a:solidFill>
-        <a:latin typeface="Arial" charset="0"/>
+        <a:latin typeface="Arial" panose="020B0604020202020204" pitchFamily="34" charset="0"/>
         <a:ea typeface="+mn-ea"/>
         <a:cs typeface="+mn-cs"/>
       </a:defRPr>
     </a:lvl9pPr>
   </p:defaultTextStyle>
-  <p:extLst>
-    <p:ext uri="{EFAFB233-063F-42B5-8137-9DF3F51BA10A}">
-      <p15:sldGuideLst xmlns="" xmlns:p15="http://schemas.microsoft.com/office/powerpoint/2012/main">
-        <p15:guide id="1" orient="horz" pos="2160">
-          <p15:clr>
-            <a:srgbClr val="A4A3A4"/>
-          </p15:clr>
-        </p15:guide>
-        <p15:guide id="2" pos="2880">
-          <p15:clr>
-            <a:srgbClr val="A4A3A4"/>
-          </p15:clr>
-        </p15:guide>
-      </p15:sldGuideLst>
-    </p:ext>
-  </p:extLst>
 </p:presentation>
 </file>
 
@@ -220,17 +204,11 @@
           <a:ln w="9525">
             <a:noFill/>
             <a:miter lim="800000"/>
-            <a:headEnd/>
-            <a:tailEnd/>
           </a:ln>
           <a:effectLst/>
         </p:spPr>
         <p:txBody>
-          <a:bodyPr vert="horz" wrap="square" lIns="91440" tIns="45720" rIns="91440" bIns="45720" numCol="1" anchor="t" anchorCtr="0" compatLnSpc="1">
-            <a:prstTxWarp prst="textNoShape">
-              <a:avLst/>
-            </a:prstTxWarp>
-          </a:bodyPr>
+          <a:bodyPr vert="horz" wrap="square" lIns="91440" tIns="45720" rIns="91440" bIns="45720" numCol="1" anchor="t" anchorCtr="0" compatLnSpc="1"/>
           <a:lstStyle>
             <a:lvl1pPr>
               <a:defRPr sz="1200"/>
@@ -266,17 +244,11 @@
           <a:ln w="9525">
             <a:noFill/>
             <a:miter lim="800000"/>
-            <a:headEnd/>
-            <a:tailEnd/>
           </a:ln>
           <a:effectLst/>
         </p:spPr>
         <p:txBody>
-          <a:bodyPr vert="horz" wrap="square" lIns="91440" tIns="45720" rIns="91440" bIns="45720" numCol="1" anchor="t" anchorCtr="0" compatLnSpc="1">
-            <a:prstTxWarp prst="textNoShape">
-              <a:avLst/>
-            </a:prstTxWarp>
-          </a:bodyPr>
+          <a:bodyPr vert="horz" wrap="square" lIns="91440" tIns="45720" rIns="91440" bIns="45720" numCol="1" anchor="t" anchorCtr="0" compatLnSpc="1"/>
           <a:lstStyle>
             <a:lvl1pPr algn="r">
               <a:defRPr sz="1200"/>
@@ -314,8 +286,6 @@
               <a:srgbClr val="000000"/>
             </a:solidFill>
             <a:miter lim="800000"/>
-            <a:headEnd/>
-            <a:tailEnd/>
           </a:ln>
         </p:spPr>
       </p:sp>
@@ -341,17 +311,11 @@
           <a:ln w="9525">
             <a:noFill/>
             <a:miter lim="800000"/>
-            <a:headEnd/>
-            <a:tailEnd/>
           </a:ln>
           <a:effectLst/>
         </p:spPr>
         <p:txBody>
-          <a:bodyPr vert="horz" wrap="square" lIns="91440" tIns="45720" rIns="91440" bIns="45720" numCol="1" anchor="t" anchorCtr="0" compatLnSpc="1">
-            <a:prstTxWarp prst="textNoShape">
-              <a:avLst/>
-            </a:prstTxWarp>
-          </a:bodyPr>
+          <a:bodyPr vert="horz" wrap="square" lIns="91440" tIns="45720" rIns="91440" bIns="45720" numCol="1" anchor="t" anchorCtr="0" compatLnSpc="1"/>
           <a:lstStyle/>
           <a:p>
             <a:pPr lvl="0"/>
@@ -359,6 +323,7 @@
               <a:rPr lang="en-US" noProof="0" smtClean="0"/>
               <a:t>Click to edit Master text styles</a:t>
             </a:r>
+            <a:endParaRPr lang="en-US" noProof="0" smtClean="0"/>
           </a:p>
           <a:p>
             <a:pPr lvl="1"/>
@@ -366,6 +331,7 @@
               <a:rPr lang="en-US" noProof="0" smtClean="0"/>
               <a:t>Second level</a:t>
             </a:r>
+            <a:endParaRPr lang="en-US" noProof="0" smtClean="0"/>
           </a:p>
           <a:p>
             <a:pPr lvl="2"/>
@@ -373,6 +339,7 @@
               <a:rPr lang="en-US" noProof="0" smtClean="0"/>
               <a:t>Third level</a:t>
             </a:r>
+            <a:endParaRPr lang="en-US" noProof="0" smtClean="0"/>
           </a:p>
           <a:p>
             <a:pPr lvl="3"/>
@@ -380,6 +347,7 @@
               <a:rPr lang="en-US" noProof="0" smtClean="0"/>
               <a:t>Fourth level</a:t>
             </a:r>
+            <a:endParaRPr lang="en-US" noProof="0" smtClean="0"/>
           </a:p>
           <a:p>
             <a:pPr lvl="4"/>
@@ -387,6 +355,7 @@
               <a:rPr lang="en-US" noProof="0" smtClean="0"/>
               <a:t>Fifth level</a:t>
             </a:r>
+            <a:endParaRPr lang="en-US" noProof="0" smtClean="0"/>
           </a:p>
         </p:txBody>
       </p:sp>
@@ -412,17 +381,11 @@
           <a:ln w="9525">
             <a:noFill/>
             <a:miter lim="800000"/>
-            <a:headEnd/>
-            <a:tailEnd/>
           </a:ln>
           <a:effectLst/>
         </p:spPr>
         <p:txBody>
-          <a:bodyPr vert="horz" wrap="square" lIns="91440" tIns="45720" rIns="91440" bIns="45720" numCol="1" anchor="b" anchorCtr="0" compatLnSpc="1">
-            <a:prstTxWarp prst="textNoShape">
-              <a:avLst/>
-            </a:prstTxWarp>
-          </a:bodyPr>
+          <a:bodyPr vert="horz" wrap="square" lIns="91440" tIns="45720" rIns="91440" bIns="45720" numCol="1" anchor="b" anchorCtr="0" compatLnSpc="1"/>
           <a:lstStyle>
             <a:lvl1pPr>
               <a:defRPr sz="1200"/>
@@ -458,17 +421,11 @@
           <a:ln w="9525">
             <a:noFill/>
             <a:miter lim="800000"/>
-            <a:headEnd/>
-            <a:tailEnd/>
           </a:ln>
           <a:effectLst/>
         </p:spPr>
         <p:txBody>
-          <a:bodyPr vert="horz" wrap="square" lIns="91440" tIns="45720" rIns="91440" bIns="45720" numCol="1" anchor="b" anchorCtr="0" compatLnSpc="1">
-            <a:prstTxWarp prst="textNoShape">
-              <a:avLst/>
-            </a:prstTxWarp>
-          </a:bodyPr>
+          <a:bodyPr vert="horz" wrap="square" lIns="91440" tIns="45720" rIns="91440" bIns="45720" numCol="1" anchor="b" anchorCtr="0" compatLnSpc="1"/>
           <a:lstStyle>
             <a:lvl1pPr algn="r">
               <a:defRPr sz="1200"/>
@@ -480,21 +437,12 @@
             </a:pPr>
             <a:fld id="{60CEDF7D-743A-4981-90DA-3AEAE2B6A9C1}" type="slidenum">
               <a:rPr lang="en-US"/>
-              <a:pPr>
-                <a:defRPr/>
-              </a:pPr>
-              <a:t>‹#›</a:t>
             </a:fld>
             <a:endParaRPr lang="en-US"/>
           </a:p>
         </p:txBody>
       </p:sp>
     </p:spTree>
-    <p:extLst>
-      <p:ext uri="{BB962C8B-B14F-4D97-AF65-F5344CB8AC3E}">
-        <p14:creationId xmlns:p14="http://schemas.microsoft.com/office/powerpoint/2010/main" val="98477175"/>
-      </p:ext>
-    </p:extLst>
   </p:cSld>
   <p:clrMap bg1="lt1" tx1="dk1" bg2="lt2" tx2="dk2" accent1="accent1" accent2="accent2" accent3="accent3" accent4="accent4" accent5="accent5" accent6="accent6" hlink="hlink" folHlink="folHlink"/>
   <p:notesStyle>
@@ -509,7 +457,7 @@
         <a:solidFill>
           <a:schemeClr val="tx1"/>
         </a:solidFill>
-        <a:latin typeface="Arial" charset="0"/>
+        <a:latin typeface="Arial" panose="020B0604020202020204" pitchFamily="34" charset="0"/>
         <a:ea typeface="+mn-ea"/>
         <a:cs typeface="+mn-cs"/>
       </a:defRPr>
@@ -525,7 +473,7 @@
         <a:solidFill>
           <a:schemeClr val="tx1"/>
         </a:solidFill>
-        <a:latin typeface="Arial" charset="0"/>
+        <a:latin typeface="Arial" panose="020B0604020202020204" pitchFamily="34" charset="0"/>
         <a:ea typeface="+mn-ea"/>
         <a:cs typeface="+mn-cs"/>
       </a:defRPr>
@@ -541,7 +489,7 @@
         <a:solidFill>
           <a:schemeClr val="tx1"/>
         </a:solidFill>
-        <a:latin typeface="Arial" charset="0"/>
+        <a:latin typeface="Arial" panose="020B0604020202020204" pitchFamily="34" charset="0"/>
         <a:ea typeface="+mn-ea"/>
         <a:cs typeface="+mn-cs"/>
       </a:defRPr>
@@ -557,7 +505,7 @@
         <a:solidFill>
           <a:schemeClr val="tx1"/>
         </a:solidFill>
-        <a:latin typeface="Arial" charset="0"/>
+        <a:latin typeface="Arial" panose="020B0604020202020204" pitchFamily="34" charset="0"/>
         <a:ea typeface="+mn-ea"/>
         <a:cs typeface="+mn-cs"/>
       </a:defRPr>
@@ -573,7 +521,7 @@
         <a:solidFill>
           <a:schemeClr val="tx1"/>
         </a:solidFill>
-        <a:latin typeface="Arial" charset="0"/>
+        <a:latin typeface="Arial" panose="020B0604020202020204" pitchFamily="34" charset="0"/>
         <a:ea typeface="+mn-ea"/>
         <a:cs typeface="+mn-cs"/>
       </a:defRPr>
@@ -658,8 +606,6 @@
           <a:p>
             <a:fld id="{1AD488CF-8A4C-48E7-BD03-FBDA811F10D9}" type="slidenum">
               <a:rPr lang="en-US" smtClean="0"/>
-              <a:pPr/>
-              <a:t>1</a:t>
             </a:fld>
             <a:endParaRPr lang="en-US" smtClean="0"/>
           </a:p>
@@ -675,9 +621,7 @@
             <p:ph type="sldImg"/>
           </p:nvPr>
         </p:nvSpPr>
-        <p:spPr>
-          <a:ln/>
-        </p:spPr>
+        <p:spPr/>
       </p:sp>
       <p:sp>
         <p:nvSpPr>
@@ -691,7 +635,6 @@
         </p:nvSpPr>
         <p:spPr>
           <a:noFill/>
-          <a:ln/>
         </p:spPr>
         <p:txBody>
           <a:bodyPr/>
@@ -703,11 +646,6 @@
         </p:txBody>
       </p:sp>
     </p:spTree>
-    <p:extLst>
-      <p:ext uri="{BB962C8B-B14F-4D97-AF65-F5344CB8AC3E}">
-        <p14:creationId xmlns:p14="http://schemas.microsoft.com/office/powerpoint/2010/main" val="2838088583"/>
-      </p:ext>
-    </p:extLst>
   </p:cSld>
   <p:clrMapOvr>
     <a:masterClrMapping/>
@@ -751,8 +689,6 @@
           <a:p>
             <a:fld id="{0F4B0BD2-A0EF-4414-B9C5-1B571337FE84}" type="slidenum">
               <a:rPr lang="en-US" smtClean="0"/>
-              <a:pPr/>
-              <a:t>2</a:t>
             </a:fld>
             <a:endParaRPr lang="en-US" smtClean="0"/>
           </a:p>
@@ -768,9 +704,7 @@
             <p:ph type="sldImg"/>
           </p:nvPr>
         </p:nvSpPr>
-        <p:spPr>
-          <a:ln/>
-        </p:spPr>
+        <p:spPr/>
       </p:sp>
       <p:sp>
         <p:nvSpPr>
@@ -784,7 +718,6 @@
         </p:nvSpPr>
         <p:spPr>
           <a:noFill/>
-          <a:ln/>
         </p:spPr>
         <p:txBody>
           <a:bodyPr/>
@@ -796,11 +729,6 @@
         </p:txBody>
       </p:sp>
     </p:spTree>
-    <p:extLst>
-      <p:ext uri="{BB962C8B-B14F-4D97-AF65-F5344CB8AC3E}">
-        <p14:creationId xmlns:p14="http://schemas.microsoft.com/office/powerpoint/2010/main" val="3760541228"/>
-      </p:ext>
-    </p:extLst>
   </p:cSld>
   <p:clrMapOvr>
     <a:masterClrMapping/>
@@ -844,8 +772,6 @@
           <a:p>
             <a:fld id="{B3A02BCD-3E0C-47B6-9E03-64D0F53803AA}" type="slidenum">
               <a:rPr lang="en-US" smtClean="0"/>
-              <a:pPr/>
-              <a:t>3</a:t>
             </a:fld>
             <a:endParaRPr lang="en-US" smtClean="0"/>
           </a:p>
@@ -861,9 +787,7 @@
             <p:ph type="sldImg"/>
           </p:nvPr>
         </p:nvSpPr>
-        <p:spPr>
-          <a:ln/>
-        </p:spPr>
+        <p:spPr/>
       </p:sp>
       <p:sp>
         <p:nvSpPr>
@@ -877,7 +801,6 @@
         </p:nvSpPr>
         <p:spPr>
           <a:noFill/>
-          <a:ln/>
         </p:spPr>
         <p:txBody>
           <a:bodyPr/>
@@ -889,11 +812,6 @@
         </p:txBody>
       </p:sp>
     </p:spTree>
-    <p:extLst>
-      <p:ext uri="{BB962C8B-B14F-4D97-AF65-F5344CB8AC3E}">
-        <p14:creationId xmlns:p14="http://schemas.microsoft.com/office/powerpoint/2010/main" val="1125645411"/>
-      </p:ext>
-    </p:extLst>
   </p:cSld>
   <p:clrMapOvr>
     <a:masterClrMapping/>
@@ -937,8 +855,6 @@
           <a:p>
             <a:fld id="{4D5CB590-2D95-4DC9-9736-DB6CAD304B24}" type="slidenum">
               <a:rPr lang="en-US" smtClean="0"/>
-              <a:pPr/>
-              <a:t>8</a:t>
             </a:fld>
             <a:endParaRPr lang="en-US" smtClean="0"/>
           </a:p>
@@ -954,9 +870,7 @@
             <p:ph type="sldImg"/>
           </p:nvPr>
         </p:nvSpPr>
-        <p:spPr>
-          <a:ln/>
-        </p:spPr>
+        <p:spPr/>
       </p:sp>
       <p:sp>
         <p:nvSpPr>
@@ -970,7 +884,6 @@
         </p:nvSpPr>
         <p:spPr>
           <a:noFill/>
-          <a:ln/>
         </p:spPr>
         <p:txBody>
           <a:bodyPr/>
@@ -982,11 +895,6 @@
         </p:txBody>
       </p:sp>
     </p:spTree>
-    <p:extLst>
-      <p:ext uri="{BB962C8B-B14F-4D97-AF65-F5344CB8AC3E}">
-        <p14:creationId xmlns:p14="http://schemas.microsoft.com/office/powerpoint/2010/main" val="3399590755"/>
-      </p:ext>
-    </p:extLst>
   </p:cSld>
   <p:clrMapOvr>
     <a:masterClrMapping/>
@@ -1030,8 +938,6 @@
           <a:p>
             <a:fld id="{8D9E7188-8D31-47EF-8458-A923B74EFF09}" type="slidenum">
               <a:rPr lang="en-US" smtClean="0"/>
-              <a:pPr/>
-              <a:t>18</a:t>
             </a:fld>
             <a:endParaRPr lang="en-US" smtClean="0"/>
           </a:p>
@@ -1047,9 +953,7 @@
             <p:ph type="sldImg"/>
           </p:nvPr>
         </p:nvSpPr>
-        <p:spPr>
-          <a:ln/>
-        </p:spPr>
+        <p:spPr/>
       </p:sp>
       <p:sp>
         <p:nvSpPr>
@@ -1063,7 +967,6 @@
         </p:nvSpPr>
         <p:spPr>
           <a:noFill/>
-          <a:ln/>
         </p:spPr>
         <p:txBody>
           <a:bodyPr/>
@@ -1075,11 +978,6 @@
         </p:txBody>
       </p:sp>
     </p:spTree>
-    <p:extLst>
-      <p:ext uri="{BB962C8B-B14F-4D97-AF65-F5344CB8AC3E}">
-        <p14:creationId xmlns:p14="http://schemas.microsoft.com/office/powerpoint/2010/main" val="194423848"/>
-      </p:ext>
-    </p:extLst>
   </p:cSld>
   <p:clrMapOvr>
     <a:masterClrMapping/>
@@ -1088,7 +986,7 @@
 </file>
 
 <file path=ppt/slideLayouts/slideLayout1.xml><?xml version="1.0" encoding="utf-8"?>
-<p:sldLayout xmlns:a="http://schemas.openxmlformats.org/drawingml/2006/main" xmlns:r="http://schemas.openxmlformats.org/officeDocument/2006/relationships" xmlns:p="http://schemas.openxmlformats.org/presentationml/2006/main" showMasterSp="0" type="title" preserve="1">
+<p:sldLayout xmlns:a="http://schemas.openxmlformats.org/drawingml/2006/main" xmlns:r="http://schemas.openxmlformats.org/officeDocument/2006/relationships" xmlns:p="http://schemas.openxmlformats.org/presentationml/2006/main" type="title" preserve="1" showMasterSp="0">
   <p:cSld name="Title Slide">
     <p:spTree>
       <p:nvGrpSpPr>
@@ -1126,8 +1024,6 @@
           <a:ln w="9525">
             <a:noFill/>
             <a:miter lim="800000"/>
-            <a:headEnd/>
-            <a:tailEnd/>
           </a:ln>
           <a:effectLst/>
         </p:spPr>
@@ -1176,8 +1072,6 @@
           <a:ln w="9525">
             <a:noFill/>
             <a:round/>
-            <a:headEnd/>
-            <a:tailEnd/>
           </a:ln>
           <a:effectLst/>
         </p:spPr>
@@ -1216,8 +1110,6 @@
               <a:schemeClr val="tx1"/>
             </a:solidFill>
             <a:miter lim="800000"/>
-            <a:headEnd/>
-            <a:tailEnd/>
           </a:ln>
           <a:effectLst/>
         </p:spPr>
@@ -1254,8 +1146,6 @@
           <a:ln w="9525">
             <a:noFill/>
             <a:round/>
-            <a:headEnd/>
-            <a:tailEnd/>
           </a:ln>
           <a:effectLst>
             <a:outerShdw dist="172739" dir="3238358" algn="ctr" rotWithShape="0">
@@ -1277,9 +1167,7 @@
       <p:sp>
         <p:nvSpPr>
           <p:cNvPr id="8" name="Freeform 9" descr="1"/>
-          <p:cNvSpPr>
-            <a:spLocks/>
-          </p:cNvSpPr>
+          <p:cNvSpPr/>
           <p:nvPr/>
         </p:nvSpPr>
         <p:spPr bwMode="gray">
@@ -1344,8 +1232,6 @@
           <a:ln w="76200" cmpd="sng">
             <a:noFill/>
             <a:round/>
-            <a:headEnd/>
-            <a:tailEnd/>
           </a:ln>
           <a:effectLst/>
         </p:spPr>
@@ -1363,9 +1249,7 @@
       <p:sp>
         <p:nvSpPr>
           <p:cNvPr id="9" name="Freeform 10" descr="2"/>
-          <p:cNvSpPr>
-            <a:spLocks/>
-          </p:cNvSpPr>
+          <p:cNvSpPr/>
           <p:nvPr/>
         </p:nvSpPr>
         <p:spPr bwMode="gray">
@@ -1430,8 +1314,6 @@
           <a:ln w="76200" cmpd="sng">
             <a:noFill/>
             <a:round/>
-            <a:headEnd/>
-            <a:tailEnd/>
           </a:ln>
           <a:effectLst/>
         </p:spPr>
@@ -1449,9 +1331,7 @@
       <p:sp>
         <p:nvSpPr>
           <p:cNvPr id="10" name="Freeform 11" descr="55282"/>
-          <p:cNvSpPr>
-            <a:spLocks/>
-          </p:cNvSpPr>
+          <p:cNvSpPr/>
           <p:nvPr/>
         </p:nvSpPr>
         <p:spPr bwMode="gray">
@@ -1516,8 +1396,6 @@
           <a:ln w="76200" cmpd="sng">
             <a:noFill/>
             <a:round/>
-            <a:headEnd/>
-            <a:tailEnd/>
           </a:ln>
           <a:effectLst/>
         </p:spPr>
@@ -1535,9 +1413,7 @@
       <p:sp>
         <p:nvSpPr>
           <p:cNvPr id="11" name="Freeform 14" descr="4"/>
-          <p:cNvSpPr>
-            <a:spLocks/>
-          </p:cNvSpPr>
+          <p:cNvSpPr/>
           <p:nvPr/>
         </p:nvSpPr>
         <p:spPr bwMode="gray">
@@ -1602,8 +1478,6 @@
           <a:ln w="76200" cmpd="sng">
             <a:noFill/>
             <a:round/>
-            <a:headEnd/>
-            <a:tailEnd/>
           </a:ln>
           <a:effectLst/>
         </p:spPr>
@@ -1640,8 +1514,6 @@
           <a:ln w="9525">
             <a:noFill/>
             <a:round/>
-            <a:headEnd/>
-            <a:tailEnd/>
           </a:ln>
           <a:effectLst/>
         </p:spPr>
@@ -1676,8 +1548,6 @@
           <a:ln w="9525">
             <a:noFill/>
             <a:miter lim="800000"/>
-            <a:headEnd/>
-            <a:tailEnd/>
           </a:ln>
           <a:effectLst/>
         </p:spPr>
@@ -1692,10 +1562,13 @@
             </a:pPr>
             <a:r>
               <a:rPr lang="en-US" sz="2800" b="1">
-                <a:latin typeface="Verdana" pitchFamily="34" charset="0"/>
+                <a:latin typeface="Verdana" panose="020B0604030504040204" pitchFamily="34" charset="0"/>
               </a:rPr>
               <a:t>LOGO</a:t>
             </a:r>
+            <a:endParaRPr lang="en-US" sz="2800" b="1">
+              <a:latin typeface="Verdana" panose="020B0604030504040204" pitchFamily="34" charset="0"/>
+            </a:endParaRPr>
           </a:p>
         </p:txBody>
       </p:sp>
@@ -1706,7 +1579,7 @@
             <a:spLocks noGrp="1" noChangeArrowheads="1"/>
           </p:cNvSpPr>
           <p:nvPr>
-            <p:ph type="ctrTitle"/>
+            <p:ph type="ctrTitle" hasCustomPrompt="1"/>
           </p:nvPr>
         </p:nvSpPr>
         <p:spPr>
@@ -1750,6 +1623,7 @@
               <a:rPr lang="en-US"/>
               <a:t>style</a:t>
             </a:r>
+            <a:endParaRPr lang="en-US"/>
           </a:p>
         </p:txBody>
       </p:sp>
@@ -1773,7 +1647,7 @@
           <a:bodyPr/>
           <a:lstStyle>
             <a:lvl1pPr marL="0" indent="0" algn="r">
-              <a:buFont typeface="Wingdings" pitchFamily="2" charset="2"/>
+              <a:buFont typeface="Wingdings" panose="05000000000000000000" pitchFamily="2" charset="2"/>
               <a:buNone/>
               <a:defRPr sz="1600" b="0">
                 <a:solidFill>
@@ -1787,6 +1661,7 @@
               <a:rPr lang="en-US"/>
               <a:t>Click to edit Master subtitle style</a:t>
             </a:r>
+            <a:endParaRPr lang="en-US"/>
           </a:p>
         </p:txBody>
       </p:sp>
@@ -1810,16 +1685,10 @@
           </a:prstGeom>
           <a:ln>
             <a:miter lim="800000"/>
-            <a:headEnd/>
-            <a:tailEnd/>
           </a:ln>
         </p:spPr>
         <p:txBody>
-          <a:bodyPr vert="horz" wrap="square" lIns="91440" tIns="45720" rIns="91440" bIns="45720" numCol="1" anchor="t" anchorCtr="0" compatLnSpc="1">
-            <a:prstTxWarp prst="textNoShape">
-              <a:avLst/>
-            </a:prstTxWarp>
-          </a:bodyPr>
+          <a:bodyPr vert="horz" wrap="square" lIns="91440" tIns="45720" rIns="91440" bIns="45720" numCol="1" anchor="t" anchorCtr="0" compatLnSpc="1"/>
           <a:lstStyle>
             <a:lvl1pPr>
               <a:defRPr sz="1200">
@@ -1857,16 +1726,10 @@
           </a:prstGeom>
           <a:ln>
             <a:miter lim="800000"/>
-            <a:headEnd/>
-            <a:tailEnd/>
           </a:ln>
         </p:spPr>
         <p:txBody>
-          <a:bodyPr vert="horz" wrap="square" lIns="91440" tIns="45720" rIns="91440" bIns="45720" numCol="1" anchor="t" anchorCtr="0" compatLnSpc="1">
-            <a:prstTxWarp prst="textNoShape">
-              <a:avLst/>
-            </a:prstTxWarp>
-          </a:bodyPr>
+          <a:bodyPr vert="horz" wrap="square" lIns="91440" tIns="45720" rIns="91440" bIns="45720" numCol="1" anchor="t" anchorCtr="0" compatLnSpc="1"/>
           <a:lstStyle>
             <a:lvl1pPr algn="ctr">
               <a:defRPr sz="1200">
@@ -1917,10 +1780,6 @@
             </a:pPr>
             <a:fld id="{2EF23353-3948-4CCD-836B-E6A2F79F06A4}" type="slidenum">
               <a:rPr lang="en-US"/>
-              <a:pPr>
-                <a:defRPr/>
-              </a:pPr>
-              <a:t>‹#›</a:t>
             </a:fld>
             <a:endParaRPr lang="en-US"/>
           </a:p>
@@ -1994,6 +1853,7 @@
               <a:rPr lang="en-US" smtClean="0"/>
               <a:t>Click to edit Master text styles</a:t>
             </a:r>
+            <a:endParaRPr lang="en-US" smtClean="0"/>
           </a:p>
           <a:p>
             <a:pPr lvl="1"/>
@@ -2001,6 +1861,7 @@
               <a:rPr lang="en-US" smtClean="0"/>
               <a:t>Second level</a:t>
             </a:r>
+            <a:endParaRPr lang="en-US" smtClean="0"/>
           </a:p>
           <a:p>
             <a:pPr lvl="2"/>
@@ -2008,6 +1869,7 @@
               <a:rPr lang="en-US" smtClean="0"/>
               <a:t>Third level</a:t>
             </a:r>
+            <a:endParaRPr lang="en-US" smtClean="0"/>
           </a:p>
           <a:p>
             <a:pPr lvl="3"/>
@@ -2015,6 +1877,7 @@
               <a:rPr lang="en-US" smtClean="0"/>
               <a:t>Fourth level</a:t>
             </a:r>
+            <a:endParaRPr lang="en-US" smtClean="0"/>
           </a:p>
           <a:p>
             <a:pPr lvl="4"/>
@@ -2036,9 +1899,7 @@
             <p:ph type="sldNum" sz="quarter" idx="10"/>
           </p:nvPr>
         </p:nvSpPr>
-        <p:spPr>
-          <a:ln/>
-        </p:spPr>
+        <p:spPr/>
         <p:txBody>
           <a:bodyPr/>
           <a:lstStyle>
@@ -2052,10 +1913,6 @@
             </a:pPr>
             <a:fld id="{1B7D1F2E-FCBD-4F84-8DC6-68C8462216EF}" type="slidenum">
               <a:rPr lang="en-US"/>
-              <a:pPr>
-                <a:defRPr/>
-              </a:pPr>
-              <a:t>‹#›</a:t>
             </a:fld>
             <a:endParaRPr lang="en-US"/>
           </a:p>
@@ -2139,6 +1996,7 @@
               <a:rPr lang="en-US" smtClean="0"/>
               <a:t>Click to edit Master text styles</a:t>
             </a:r>
+            <a:endParaRPr lang="en-US" smtClean="0"/>
           </a:p>
           <a:p>
             <a:pPr lvl="1"/>
@@ -2146,6 +2004,7 @@
               <a:rPr lang="en-US" smtClean="0"/>
               <a:t>Second level</a:t>
             </a:r>
+            <a:endParaRPr lang="en-US" smtClean="0"/>
           </a:p>
           <a:p>
             <a:pPr lvl="2"/>
@@ -2153,6 +2012,7 @@
               <a:rPr lang="en-US" smtClean="0"/>
               <a:t>Third level</a:t>
             </a:r>
+            <a:endParaRPr lang="en-US" smtClean="0"/>
           </a:p>
           <a:p>
             <a:pPr lvl="3"/>
@@ -2160,6 +2020,7 @@
               <a:rPr lang="en-US" smtClean="0"/>
               <a:t>Fourth level</a:t>
             </a:r>
+            <a:endParaRPr lang="en-US" smtClean="0"/>
           </a:p>
           <a:p>
             <a:pPr lvl="4"/>
@@ -2181,9 +2042,7 @@
             <p:ph type="sldNum" sz="quarter" idx="10"/>
           </p:nvPr>
         </p:nvSpPr>
-        <p:spPr>
-          <a:ln/>
-        </p:spPr>
+        <p:spPr/>
         <p:txBody>
           <a:bodyPr/>
           <a:lstStyle>
@@ -2197,10 +2056,6 @@
             </a:pPr>
             <a:fld id="{B77A3C6F-D8B9-4D7B-BEFF-88FE86B6EB02}" type="slidenum">
               <a:rPr lang="en-US"/>
-              <a:pPr>
-                <a:defRPr/>
-              </a:pPr>
-              <a:t>‹#›</a:t>
             </a:fld>
             <a:endParaRPr lang="en-US"/>
           </a:p>
@@ -2294,9 +2149,7 @@
             <p:ph type="sldNum" sz="quarter" idx="10"/>
           </p:nvPr>
         </p:nvSpPr>
-        <p:spPr>
-          <a:ln/>
-        </p:spPr>
+        <p:spPr/>
         <p:txBody>
           <a:bodyPr/>
           <a:lstStyle>
@@ -2310,10 +2163,6 @@
             </a:pPr>
             <a:fld id="{28A0C899-322F-43A1-A8D9-A0F99F0F0D32}" type="slidenum">
               <a:rPr lang="en-US"/>
-              <a:pPr>
-                <a:defRPr/>
-              </a:pPr>
-              <a:t>‹#›</a:t>
             </a:fld>
             <a:endParaRPr lang="en-US"/>
           </a:p>
@@ -2387,6 +2236,7 @@
               <a:rPr lang="en-US" smtClean="0"/>
               <a:t>Click to edit Master text styles</a:t>
             </a:r>
+            <a:endParaRPr lang="en-US" smtClean="0"/>
           </a:p>
           <a:p>
             <a:pPr lvl="1"/>
@@ -2394,6 +2244,7 @@
               <a:rPr lang="en-US" smtClean="0"/>
               <a:t>Second level</a:t>
             </a:r>
+            <a:endParaRPr lang="en-US" smtClean="0"/>
           </a:p>
           <a:p>
             <a:pPr lvl="2"/>
@@ -2401,6 +2252,7 @@
               <a:rPr lang="en-US" smtClean="0"/>
               <a:t>Third level</a:t>
             </a:r>
+            <a:endParaRPr lang="en-US" smtClean="0"/>
           </a:p>
           <a:p>
             <a:pPr lvl="3"/>
@@ -2408,6 +2260,7 @@
               <a:rPr lang="en-US" smtClean="0"/>
               <a:t>Fourth level</a:t>
             </a:r>
+            <a:endParaRPr lang="en-US" smtClean="0"/>
           </a:p>
           <a:p>
             <a:pPr lvl="4"/>
@@ -2429,9 +2282,7 @@
             <p:ph type="sldNum" sz="quarter" idx="10"/>
           </p:nvPr>
         </p:nvSpPr>
-        <p:spPr>
-          <a:ln/>
-        </p:spPr>
+        <p:spPr/>
         <p:txBody>
           <a:bodyPr/>
           <a:lstStyle>
@@ -2445,10 +2296,6 @@
             </a:pPr>
             <a:fld id="{58F6B77B-59A0-4418-B989-54E8E0A40C73}" type="slidenum">
               <a:rPr lang="en-US"/>
-              <a:pPr>
-                <a:defRPr/>
-              </a:pPr>
-              <a:t>‹#›</a:t>
             </a:fld>
             <a:endParaRPr lang="en-US"/>
           </a:p>
@@ -2573,6 +2420,7 @@
               <a:rPr lang="en-US" smtClean="0"/>
               <a:t>Click to edit Master text styles</a:t>
             </a:r>
+            <a:endParaRPr lang="en-US" smtClean="0"/>
           </a:p>
         </p:txBody>
       </p:sp>
@@ -2586,9 +2434,7 @@
             <p:ph type="sldNum" sz="quarter" idx="10"/>
           </p:nvPr>
         </p:nvSpPr>
-        <p:spPr>
-          <a:ln/>
-        </p:spPr>
+        <p:spPr/>
         <p:txBody>
           <a:bodyPr/>
           <a:lstStyle>
@@ -2602,10 +2448,6 @@
             </a:pPr>
             <a:fld id="{6050AD0C-9423-4A45-8E7E-C42325251218}" type="slidenum">
               <a:rPr lang="en-US"/>
-              <a:pPr>
-                <a:defRPr/>
-              </a:pPr>
-              <a:t>‹#›</a:t>
             </a:fld>
             <a:endParaRPr lang="en-US"/>
           </a:p>
@@ -2712,6 +2554,7 @@
               <a:rPr lang="en-US" smtClean="0"/>
               <a:t>Click to edit Master text styles</a:t>
             </a:r>
+            <a:endParaRPr lang="en-US" smtClean="0"/>
           </a:p>
           <a:p>
             <a:pPr lvl="1"/>
@@ -2719,6 +2562,7 @@
               <a:rPr lang="en-US" smtClean="0"/>
               <a:t>Second level</a:t>
             </a:r>
+            <a:endParaRPr lang="en-US" smtClean="0"/>
           </a:p>
           <a:p>
             <a:pPr lvl="2"/>
@@ -2726,6 +2570,7 @@
               <a:rPr lang="en-US" smtClean="0"/>
               <a:t>Third level</a:t>
             </a:r>
+            <a:endParaRPr lang="en-US" smtClean="0"/>
           </a:p>
           <a:p>
             <a:pPr lvl="3"/>
@@ -2733,6 +2578,7 @@
               <a:rPr lang="en-US" smtClean="0"/>
               <a:t>Fourth level</a:t>
             </a:r>
+            <a:endParaRPr lang="en-US" smtClean="0"/>
           </a:p>
           <a:p>
             <a:pPr lvl="4"/>
@@ -2797,6 +2643,7 @@
               <a:rPr lang="en-US" smtClean="0"/>
               <a:t>Click to edit Master text styles</a:t>
             </a:r>
+            <a:endParaRPr lang="en-US" smtClean="0"/>
           </a:p>
           <a:p>
             <a:pPr lvl="1"/>
@@ -2804,6 +2651,7 @@
               <a:rPr lang="en-US" smtClean="0"/>
               <a:t>Second level</a:t>
             </a:r>
+            <a:endParaRPr lang="en-US" smtClean="0"/>
           </a:p>
           <a:p>
             <a:pPr lvl="2"/>
@@ -2811,6 +2659,7 @@
               <a:rPr lang="en-US" smtClean="0"/>
               <a:t>Third level</a:t>
             </a:r>
+            <a:endParaRPr lang="en-US" smtClean="0"/>
           </a:p>
           <a:p>
             <a:pPr lvl="3"/>
@@ -2818,6 +2667,7 @@
               <a:rPr lang="en-US" smtClean="0"/>
               <a:t>Fourth level</a:t>
             </a:r>
+            <a:endParaRPr lang="en-US" smtClean="0"/>
           </a:p>
           <a:p>
             <a:pPr lvl="4"/>
@@ -2839,9 +2689,7 @@
             <p:ph type="sldNum" sz="quarter" idx="10"/>
           </p:nvPr>
         </p:nvSpPr>
-        <p:spPr>
-          <a:ln/>
-        </p:spPr>
+        <p:spPr/>
         <p:txBody>
           <a:bodyPr/>
           <a:lstStyle>
@@ -2855,10 +2703,6 @@
             </a:pPr>
             <a:fld id="{6A3A2F13-F55E-4977-A401-968352CB4291}" type="slidenum">
               <a:rPr lang="en-US"/>
-              <a:pPr>
-                <a:defRPr/>
-              </a:pPr>
-              <a:t>‹#›</a:t>
             </a:fld>
             <a:endParaRPr lang="en-US"/>
           </a:p>
@@ -2983,6 +2827,7 @@
               <a:rPr lang="en-US" smtClean="0"/>
               <a:t>Click to edit Master text styles</a:t>
             </a:r>
+            <a:endParaRPr lang="en-US" smtClean="0"/>
           </a:p>
         </p:txBody>
       </p:sp>
@@ -3039,6 +2884,7 @@
               <a:rPr lang="en-US" smtClean="0"/>
               <a:t>Click to edit Master text styles</a:t>
             </a:r>
+            <a:endParaRPr lang="en-US" smtClean="0"/>
           </a:p>
           <a:p>
             <a:pPr lvl="1"/>
@@ -3046,6 +2892,7 @@
               <a:rPr lang="en-US" smtClean="0"/>
               <a:t>Second level</a:t>
             </a:r>
+            <a:endParaRPr lang="en-US" smtClean="0"/>
           </a:p>
           <a:p>
             <a:pPr lvl="2"/>
@@ -3053,6 +2900,7 @@
               <a:rPr lang="en-US" smtClean="0"/>
               <a:t>Third level</a:t>
             </a:r>
+            <a:endParaRPr lang="en-US" smtClean="0"/>
           </a:p>
           <a:p>
             <a:pPr lvl="3"/>
@@ -3060,6 +2908,7 @@
               <a:rPr lang="en-US" smtClean="0"/>
               <a:t>Fourth level</a:t>
             </a:r>
+            <a:endParaRPr lang="en-US" smtClean="0"/>
           </a:p>
           <a:p>
             <a:pPr lvl="4"/>
@@ -3133,6 +2982,7 @@
               <a:rPr lang="en-US" smtClean="0"/>
               <a:t>Click to edit Master text styles</a:t>
             </a:r>
+            <a:endParaRPr lang="en-US" smtClean="0"/>
           </a:p>
         </p:txBody>
       </p:sp>
@@ -3189,6 +3039,7 @@
               <a:rPr lang="en-US" smtClean="0"/>
               <a:t>Click to edit Master text styles</a:t>
             </a:r>
+            <a:endParaRPr lang="en-US" smtClean="0"/>
           </a:p>
           <a:p>
             <a:pPr lvl="1"/>
@@ -3196,6 +3047,7 @@
               <a:rPr lang="en-US" smtClean="0"/>
               <a:t>Second level</a:t>
             </a:r>
+            <a:endParaRPr lang="en-US" smtClean="0"/>
           </a:p>
           <a:p>
             <a:pPr lvl="2"/>
@@ -3203,6 +3055,7 @@
               <a:rPr lang="en-US" smtClean="0"/>
               <a:t>Third level</a:t>
             </a:r>
+            <a:endParaRPr lang="en-US" smtClean="0"/>
           </a:p>
           <a:p>
             <a:pPr lvl="3"/>
@@ -3210,6 +3063,7 @@
               <a:rPr lang="en-US" smtClean="0"/>
               <a:t>Fourth level</a:t>
             </a:r>
+            <a:endParaRPr lang="en-US" smtClean="0"/>
           </a:p>
           <a:p>
             <a:pPr lvl="4"/>
@@ -3231,9 +3085,7 @@
             <p:ph type="sldNum" sz="quarter" idx="10"/>
           </p:nvPr>
         </p:nvSpPr>
-        <p:spPr>
-          <a:ln/>
-        </p:spPr>
+        <p:spPr/>
         <p:txBody>
           <a:bodyPr/>
           <a:lstStyle>
@@ -3247,10 +3099,6 @@
             </a:pPr>
             <a:fld id="{0AB739A6-F371-49C2-8CEA-1520BEF1361B}" type="slidenum">
               <a:rPr lang="en-US"/>
-              <a:pPr>
-                <a:defRPr/>
-              </a:pPr>
-              <a:t>‹#›</a:t>
             </a:fld>
             <a:endParaRPr lang="en-US"/>
           </a:p>
@@ -3314,9 +3162,7 @@
             <p:ph type="sldNum" sz="quarter" idx="10"/>
           </p:nvPr>
         </p:nvSpPr>
-        <p:spPr>
-          <a:ln/>
-        </p:spPr>
+        <p:spPr/>
         <p:txBody>
           <a:bodyPr/>
           <a:lstStyle>
@@ -3330,10 +3176,6 @@
             </a:pPr>
             <a:fld id="{DE7D85C1-2671-4189-A562-65CD79E13A50}" type="slidenum">
               <a:rPr lang="en-US"/>
-              <a:pPr>
-                <a:defRPr/>
-              </a:pPr>
-              <a:t>‹#›</a:t>
             </a:fld>
             <a:endParaRPr lang="en-US"/>
           </a:p>
@@ -3374,9 +3216,7 @@
             <p:ph type="sldNum" sz="quarter" idx="10"/>
           </p:nvPr>
         </p:nvSpPr>
-        <p:spPr>
-          <a:ln/>
-        </p:spPr>
+        <p:spPr/>
         <p:txBody>
           <a:bodyPr/>
           <a:lstStyle>
@@ -3390,10 +3230,6 @@
             </a:pPr>
             <a:fld id="{6B468115-E4DE-4C38-AA51-666975B3D95F}" type="slidenum">
               <a:rPr lang="en-US"/>
-              <a:pPr>
-                <a:defRPr/>
-              </a:pPr>
-              <a:t>‹#›</a:t>
             </a:fld>
             <a:endParaRPr lang="en-US"/>
           </a:p>
@@ -3509,6 +3345,7 @@
               <a:rPr lang="en-US" smtClean="0"/>
               <a:t>Click to edit Master text styles</a:t>
             </a:r>
+            <a:endParaRPr lang="en-US" smtClean="0"/>
           </a:p>
           <a:p>
             <a:pPr lvl="1"/>
@@ -3516,6 +3353,7 @@
               <a:rPr lang="en-US" smtClean="0"/>
               <a:t>Second level</a:t>
             </a:r>
+            <a:endParaRPr lang="en-US" smtClean="0"/>
           </a:p>
           <a:p>
             <a:pPr lvl="2"/>
@@ -3523,6 +3361,7 @@
               <a:rPr lang="en-US" smtClean="0"/>
               <a:t>Third level</a:t>
             </a:r>
+            <a:endParaRPr lang="en-US" smtClean="0"/>
           </a:p>
           <a:p>
             <a:pPr lvl="3"/>
@@ -3530,6 +3369,7 @@
               <a:rPr lang="en-US" smtClean="0"/>
               <a:t>Fourth level</a:t>
             </a:r>
+            <a:endParaRPr lang="en-US" smtClean="0"/>
           </a:p>
           <a:p>
             <a:pPr lvl="4"/>
@@ -3603,6 +3443,7 @@
               <a:rPr lang="en-US" smtClean="0"/>
               <a:t>Click to edit Master text styles</a:t>
             </a:r>
+            <a:endParaRPr lang="en-US" smtClean="0"/>
           </a:p>
         </p:txBody>
       </p:sp>
@@ -3616,9 +3457,7 @@
             <p:ph type="sldNum" sz="quarter" idx="10"/>
           </p:nvPr>
         </p:nvSpPr>
-        <p:spPr>
-          <a:ln/>
-        </p:spPr>
+        <p:spPr/>
         <p:txBody>
           <a:bodyPr/>
           <a:lstStyle>
@@ -3632,10 +3471,6 @@
             </a:pPr>
             <a:fld id="{D47A7D46-A46B-43AF-9437-E1E91246AF37}" type="slidenum">
               <a:rPr lang="en-US"/>
-              <a:pPr>
-                <a:defRPr/>
-              </a:pPr>
-              <a:t>‹#›</a:t>
             </a:fld>
             <a:endParaRPr lang="en-US"/>
           </a:p>
@@ -3822,6 +3657,7 @@
               <a:rPr lang="en-US" smtClean="0"/>
               <a:t>Click to edit Master text styles</a:t>
             </a:r>
+            <a:endParaRPr lang="en-US" smtClean="0"/>
           </a:p>
         </p:txBody>
       </p:sp>
@@ -3835,9 +3671,7 @@
             <p:ph type="sldNum" sz="quarter" idx="10"/>
           </p:nvPr>
         </p:nvSpPr>
-        <p:spPr>
-          <a:ln/>
-        </p:spPr>
+        <p:spPr/>
         <p:txBody>
           <a:bodyPr/>
           <a:lstStyle>
@@ -3851,10 +3685,6 @@
             </a:pPr>
             <a:fld id="{DC75E75C-B1D2-4B41-8063-0FEE6883FE50}" type="slidenum">
               <a:rPr lang="en-US"/>
-              <a:pPr>
-                <a:defRPr/>
-              </a:pPr>
-              <a:t>‹#›</a:t>
             </a:fld>
             <a:endParaRPr lang="en-US"/>
           </a:p>
@@ -3915,8 +3745,6 @@
           <a:ln w="9525">
             <a:noFill/>
             <a:miter lim="800000"/>
-            <a:headEnd/>
-            <a:tailEnd/>
           </a:ln>
           <a:effectLst/>
         </p:spPr>
@@ -3953,8 +3781,6 @@
           <a:ln w="9525">
             <a:noFill/>
             <a:miter lim="800000"/>
-            <a:headEnd/>
-            <a:tailEnd/>
           </a:ln>
           <a:effectLst/>
         </p:spPr>
@@ -3991,16 +3817,10 @@
           <a:ln w="9525">
             <a:noFill/>
             <a:miter lim="800000"/>
-            <a:headEnd/>
-            <a:tailEnd/>
           </a:ln>
         </p:spPr>
         <p:txBody>
-          <a:bodyPr vert="horz" wrap="square" lIns="91440" tIns="45720" rIns="91440" bIns="45720" numCol="1" anchor="t" anchorCtr="0" compatLnSpc="1">
-            <a:prstTxWarp prst="textNoShape">
-              <a:avLst/>
-            </a:prstTxWarp>
-          </a:bodyPr>
+          <a:bodyPr vert="horz" wrap="square" lIns="91440" tIns="45720" rIns="91440" bIns="45720" numCol="1" anchor="t" anchorCtr="0" compatLnSpc="1"/>
           <a:lstStyle/>
           <a:p>
             <a:pPr lvl="0"/>
@@ -4008,6 +3828,7 @@
               <a:rPr lang="en-US" smtClean="0"/>
               <a:t>Click to edit Master text styles</a:t>
             </a:r>
+            <a:endParaRPr lang="en-US" smtClean="0"/>
           </a:p>
           <a:p>
             <a:pPr lvl="1"/>
@@ -4015,6 +3836,7 @@
               <a:rPr lang="en-US" smtClean="0"/>
               <a:t>Second level</a:t>
             </a:r>
+            <a:endParaRPr lang="en-US" smtClean="0"/>
           </a:p>
           <a:p>
             <a:pPr lvl="2"/>
@@ -4022,6 +3844,7 @@
               <a:rPr lang="en-US" smtClean="0"/>
               <a:t>Third level</a:t>
             </a:r>
+            <a:endParaRPr lang="en-US" smtClean="0"/>
           </a:p>
           <a:p>
             <a:pPr lvl="3"/>
@@ -4029,6 +3852,7 @@
               <a:rPr lang="en-US" smtClean="0"/>
               <a:t>Fourth level</a:t>
             </a:r>
+            <a:endParaRPr lang="en-US" smtClean="0"/>
           </a:p>
           <a:p>
             <a:pPr lvl="4"/>
@@ -4036,6 +3860,7 @@
               <a:rPr lang="en-US" smtClean="0"/>
               <a:t>Fifth level</a:t>
             </a:r>
+            <a:endParaRPr lang="en-US" smtClean="0"/>
           </a:p>
         </p:txBody>
       </p:sp>
@@ -4061,17 +3886,11 @@
           <a:ln w="9525">
             <a:noFill/>
             <a:miter lim="800000"/>
-            <a:headEnd/>
-            <a:tailEnd/>
           </a:ln>
           <a:effectLst/>
         </p:spPr>
         <p:txBody>
-          <a:bodyPr vert="horz" wrap="square" lIns="91440" tIns="45720" rIns="91440" bIns="45720" numCol="1" anchor="t" anchorCtr="0" compatLnSpc="1">
-            <a:prstTxWarp prst="textNoShape">
-              <a:avLst/>
-            </a:prstTxWarp>
-          </a:bodyPr>
+          <a:bodyPr vert="horz" wrap="square" lIns="91440" tIns="45720" rIns="91440" bIns="45720" numCol="1" anchor="t" anchorCtr="0" compatLnSpc="1"/>
           <a:lstStyle>
             <a:lvl1pPr algn="r">
               <a:defRPr sz="1400"/>
@@ -4083,10 +3902,6 @@
             </a:pPr>
             <a:fld id="{9259F25C-EA57-46BB-8362-6F15724DC5FE}" type="slidenum">
               <a:rPr lang="en-US"/>
-              <a:pPr>
-                <a:defRPr/>
-              </a:pPr>
-              <a:t>‹#›</a:t>
             </a:fld>
             <a:endParaRPr lang="en-US"/>
           </a:p>
@@ -4114,16 +3929,10 @@
           <a:ln w="9525">
             <a:noFill/>
             <a:miter lim="800000"/>
-            <a:headEnd/>
-            <a:tailEnd/>
           </a:ln>
         </p:spPr>
         <p:txBody>
-          <a:bodyPr vert="horz" wrap="square" lIns="91440" tIns="45720" rIns="91440" bIns="45720" numCol="1" anchor="ctr" anchorCtr="0" compatLnSpc="1">
-            <a:prstTxWarp prst="textNoShape">
-              <a:avLst/>
-            </a:prstTxWarp>
-          </a:bodyPr>
+          <a:bodyPr vert="horz" wrap="square" lIns="91440" tIns="45720" rIns="91440" bIns="45720" numCol="1" anchor="ctr" anchorCtr="0" compatLnSpc="1"/>
           <a:lstStyle/>
           <a:p>
             <a:pPr lvl="0"/>
@@ -4131,15 +3940,14 @@
               <a:rPr lang="en-US" smtClean="0"/>
               <a:t>Click to edit Master title style</a:t>
             </a:r>
+            <a:endParaRPr lang="en-US" smtClean="0"/>
           </a:p>
         </p:txBody>
       </p:sp>
       <p:grpSp>
         <p:nvGrpSpPr>
           <p:cNvPr id="1031" name="Group 9"/>
-          <p:cNvGrpSpPr>
-            <a:grpSpLocks/>
-          </p:cNvGrpSpPr>
+          <p:cNvGrpSpPr/>
           <p:nvPr/>
         </p:nvGrpSpPr>
         <p:grpSpPr bwMode="auto">
@@ -4184,8 +3992,6 @@
             <a:ln w="9525">
               <a:noFill/>
               <a:round/>
-              <a:headEnd/>
-              <a:tailEnd/>
             </a:ln>
             <a:effectLst/>
           </p:spPr>
@@ -4222,8 +4028,6 @@
             <a:ln w="9525">
               <a:noFill/>
               <a:round/>
-              <a:headEnd/>
-              <a:tailEnd/>
             </a:ln>
             <a:effectLst>
               <a:outerShdw dist="63500" dir="2212194" algn="ctr" rotWithShape="0">
@@ -4245,9 +4049,7 @@
         <p:sp>
           <p:nvSpPr>
             <p:cNvPr id="4108" name="Freeform 12" descr="4"/>
-            <p:cNvSpPr>
-              <a:spLocks/>
-            </p:cNvSpPr>
+            <p:cNvSpPr/>
             <p:nvPr userDrawn="1"/>
           </p:nvSpPr>
           <p:spPr bwMode="gray">
@@ -4303,7 +4105,7 @@
               </a:pathLst>
             </a:custGeom>
             <a:blipFill dpi="0" rotWithShape="1">
-              <a:blip r:embed="rId14" cstate="print"/>
+              <a:blip r:embed="rId13" cstate="print"/>
               <a:srcRect/>
               <a:stretch>
                 <a:fillRect/>
@@ -4312,8 +4114,6 @@
             <a:ln w="76200" cmpd="sng">
               <a:noFill/>
               <a:round/>
-              <a:headEnd/>
-              <a:tailEnd/>
             </a:ln>
             <a:effectLst/>
           </p:spPr>
@@ -4331,9 +4131,7 @@
         <p:sp>
           <p:nvSpPr>
             <p:cNvPr id="4109" name="Freeform 13" descr="1"/>
-            <p:cNvSpPr>
-              <a:spLocks/>
-            </p:cNvSpPr>
+            <p:cNvSpPr/>
             <p:nvPr userDrawn="1"/>
           </p:nvSpPr>
           <p:spPr bwMode="gray">
@@ -4389,7 +4187,7 @@
               </a:pathLst>
             </a:custGeom>
             <a:blipFill dpi="0" rotWithShape="1">
-              <a:blip r:embed="rId15" cstate="print"/>
+              <a:blip r:embed="rId14" cstate="print"/>
               <a:srcRect/>
               <a:stretch>
                 <a:fillRect/>
@@ -4398,8 +4196,6 @@
             <a:ln w="76200" cmpd="sng">
               <a:noFill/>
               <a:round/>
-              <a:headEnd/>
-              <a:tailEnd/>
             </a:ln>
             <a:effectLst/>
           </p:spPr>
@@ -4417,9 +4213,7 @@
         <p:sp>
           <p:nvSpPr>
             <p:cNvPr id="4110" name="Freeform 14" descr="2"/>
-            <p:cNvSpPr>
-              <a:spLocks/>
-            </p:cNvSpPr>
+            <p:cNvSpPr/>
             <p:nvPr userDrawn="1"/>
           </p:nvSpPr>
           <p:spPr bwMode="gray">
@@ -4475,7 +4269,7 @@
               </a:pathLst>
             </a:custGeom>
             <a:blipFill dpi="0" rotWithShape="1">
-              <a:blip r:embed="rId16" cstate="print"/>
+              <a:blip r:embed="rId15" cstate="print"/>
               <a:srcRect/>
               <a:stretch>
                 <a:fillRect/>
@@ -4484,8 +4278,6 @@
             <a:ln w="76200" cmpd="sng">
               <a:noFill/>
               <a:round/>
-              <a:headEnd/>
-              <a:tailEnd/>
             </a:ln>
             <a:effectLst/>
           </p:spPr>
@@ -4503,9 +4295,7 @@
         <p:sp>
           <p:nvSpPr>
             <p:cNvPr id="4111" name="Freeform 15" descr="55282"/>
-            <p:cNvSpPr>
-              <a:spLocks/>
-            </p:cNvSpPr>
+            <p:cNvSpPr/>
             <p:nvPr userDrawn="1"/>
           </p:nvSpPr>
           <p:spPr bwMode="gray">
@@ -4561,7 +4351,7 @@
               </a:pathLst>
             </a:custGeom>
             <a:blipFill dpi="0" rotWithShape="1">
-              <a:blip r:embed="rId17" cstate="print"/>
+              <a:blip r:embed="rId16" cstate="print"/>
               <a:srcRect/>
               <a:stretch>
                 <a:fillRect/>
@@ -4570,8 +4360,6 @@
             <a:ln w="76200" cmpd="sng">
               <a:noFill/>
               <a:round/>
-              <a:headEnd/>
-              <a:tailEnd/>
             </a:ln>
             <a:effectLst/>
           </p:spPr>
@@ -4608,8 +4396,6 @@
             <a:ln w="9525">
               <a:noFill/>
               <a:round/>
-              <a:headEnd/>
-              <a:tailEnd/>
             </a:ln>
             <a:effectLst/>
           </p:spPr>
@@ -4629,18 +4415,18 @@
   </p:cSld>
   <p:clrMap bg1="lt1" tx1="dk1" bg2="lt2" tx2="dk2" accent1="accent1" accent2="accent2" accent3="accent3" accent4="accent4" accent5="accent5" accent6="accent6" hlink="hlink" folHlink="folHlink"/>
   <p:sldLayoutIdLst>
-    <p:sldLayoutId id="2147483687" r:id="rId1"/>
-    <p:sldLayoutId id="2147483676" r:id="rId2"/>
-    <p:sldLayoutId id="2147483677" r:id="rId3"/>
-    <p:sldLayoutId id="2147483678" r:id="rId4"/>
-    <p:sldLayoutId id="2147483679" r:id="rId5"/>
-    <p:sldLayoutId id="2147483680" r:id="rId6"/>
-    <p:sldLayoutId id="2147483681" r:id="rId7"/>
-    <p:sldLayoutId id="2147483682" r:id="rId8"/>
-    <p:sldLayoutId id="2147483683" r:id="rId9"/>
-    <p:sldLayoutId id="2147483684" r:id="rId10"/>
-    <p:sldLayoutId id="2147483685" r:id="rId11"/>
-    <p:sldLayoutId id="2147483686" r:id="rId12"/>
+    <p:sldLayoutId id="2147483649" r:id="rId1"/>
+    <p:sldLayoutId id="2147483650" r:id="rId2"/>
+    <p:sldLayoutId id="2147483651" r:id="rId3"/>
+    <p:sldLayoutId id="2147483652" r:id="rId4"/>
+    <p:sldLayoutId id="2147483653" r:id="rId5"/>
+    <p:sldLayoutId id="2147483654" r:id="rId6"/>
+    <p:sldLayoutId id="2147483655" r:id="rId7"/>
+    <p:sldLayoutId id="2147483656" r:id="rId8"/>
+    <p:sldLayoutId id="2147483657" r:id="rId9"/>
+    <p:sldLayoutId id="2147483658" r:id="rId10"/>
+    <p:sldLayoutId id="2147483659" r:id="rId11"/>
+    <p:sldLayoutId id="2147483660" r:id="rId12"/>
   </p:sldLayoutIdLst>
   <p:txStyles>
     <p:titleStyle>
@@ -4671,7 +4457,7 @@
           <a:solidFill>
             <a:schemeClr val="bg1"/>
           </a:solidFill>
-          <a:latin typeface="Verdana" pitchFamily="34" charset="0"/>
+          <a:latin typeface="Verdana" panose="020B0604030504040204" pitchFamily="34" charset="0"/>
         </a:defRPr>
       </a:lvl2pPr>
       <a:lvl3pPr algn="l" rtl="0" eaLnBrk="0" fontAlgn="base" hangingPunct="0">
@@ -4685,7 +4471,7 @@
           <a:solidFill>
             <a:schemeClr val="bg1"/>
           </a:solidFill>
-          <a:latin typeface="Verdana" pitchFamily="34" charset="0"/>
+          <a:latin typeface="Verdana" panose="020B0604030504040204" pitchFamily="34" charset="0"/>
         </a:defRPr>
       </a:lvl3pPr>
       <a:lvl4pPr algn="l" rtl="0" eaLnBrk="0" fontAlgn="base" hangingPunct="0">
@@ -4699,7 +4485,7 @@
           <a:solidFill>
             <a:schemeClr val="bg1"/>
           </a:solidFill>
-          <a:latin typeface="Verdana" pitchFamily="34" charset="0"/>
+          <a:latin typeface="Verdana" panose="020B0604030504040204" pitchFamily="34" charset="0"/>
         </a:defRPr>
       </a:lvl4pPr>
       <a:lvl5pPr algn="l" rtl="0" eaLnBrk="0" fontAlgn="base" hangingPunct="0">
@@ -4713,7 +4499,7 @@
           <a:solidFill>
             <a:schemeClr val="bg1"/>
           </a:solidFill>
-          <a:latin typeface="Verdana" pitchFamily="34" charset="0"/>
+          <a:latin typeface="Verdana" panose="020B0604030504040204" pitchFamily="34" charset="0"/>
         </a:defRPr>
       </a:lvl5pPr>
       <a:lvl6pPr marL="457200" algn="l" rtl="0" fontAlgn="base">
@@ -4727,7 +4513,7 @@
           <a:solidFill>
             <a:schemeClr val="bg1"/>
           </a:solidFill>
-          <a:latin typeface="Verdana" pitchFamily="34" charset="0"/>
+          <a:latin typeface="Verdana" panose="020B0604030504040204" pitchFamily="34" charset="0"/>
         </a:defRPr>
       </a:lvl6pPr>
       <a:lvl7pPr marL="914400" algn="l" rtl="0" fontAlgn="base">
@@ -4741,7 +4527,7 @@
           <a:solidFill>
             <a:schemeClr val="bg1"/>
           </a:solidFill>
-          <a:latin typeface="Verdana" pitchFamily="34" charset="0"/>
+          <a:latin typeface="Verdana" panose="020B0604030504040204" pitchFamily="34" charset="0"/>
         </a:defRPr>
       </a:lvl7pPr>
       <a:lvl8pPr marL="1371600" algn="l" rtl="0" fontAlgn="base">
@@ -4755,7 +4541,7 @@
           <a:solidFill>
             <a:schemeClr val="bg1"/>
           </a:solidFill>
-          <a:latin typeface="Verdana" pitchFamily="34" charset="0"/>
+          <a:latin typeface="Verdana" panose="020B0604030504040204" pitchFamily="34" charset="0"/>
         </a:defRPr>
       </a:lvl8pPr>
       <a:lvl9pPr marL="1828800" algn="l" rtl="0" fontAlgn="base">
@@ -4769,7 +4555,7 @@
           <a:solidFill>
             <a:schemeClr val="bg1"/>
           </a:solidFill>
-          <a:latin typeface="Verdana" pitchFamily="34" charset="0"/>
+          <a:latin typeface="Verdana" panose="020B0604030504040204" pitchFamily="34" charset="0"/>
         </a:defRPr>
       </a:lvl9pPr>
     </p:titleStyle>
@@ -4784,7 +4570,7 @@
         <a:buClr>
           <a:schemeClr val="hlink"/>
         </a:buClr>
-        <a:buFont typeface="Wingdings" pitchFamily="2" charset="2"/>
+        <a:buFont typeface="Wingdings" panose="05000000000000000000" pitchFamily="2" charset="2"/>
         <a:buChar char="v"/>
         <a:defRPr sz="2800" b="1">
           <a:solidFill>
@@ -4805,13 +4591,13 @@
         <a:buClr>
           <a:schemeClr val="accent1"/>
         </a:buClr>
-        <a:buFont typeface="Wingdings" pitchFamily="2" charset="2"/>
+        <a:buFont typeface="Wingdings" panose="05000000000000000000" pitchFamily="2" charset="2"/>
         <a:buChar char="§"/>
         <a:defRPr sz="2800">
           <a:solidFill>
             <a:schemeClr val="tx1"/>
           </a:solidFill>
-          <a:latin typeface="Arial" charset="0"/>
+          <a:latin typeface="Arial" panose="020B0604020202020204" pitchFamily="34" charset="0"/>
         </a:defRPr>
       </a:lvl2pPr>
       <a:lvl3pPr marL="1143000" indent="-228600" algn="l" rtl="0" eaLnBrk="0" fontAlgn="base" hangingPunct="0">
@@ -4829,7 +4615,7 @@
           <a:solidFill>
             <a:schemeClr val="tx1"/>
           </a:solidFill>
-          <a:latin typeface="Arial" charset="0"/>
+          <a:latin typeface="Arial" panose="020B0604020202020204" pitchFamily="34" charset="0"/>
         </a:defRPr>
       </a:lvl3pPr>
       <a:lvl4pPr marL="1600200" indent="-228600" algn="l" rtl="0" eaLnBrk="0" fontAlgn="base" hangingPunct="0">
@@ -4844,7 +4630,7 @@
           <a:solidFill>
             <a:schemeClr val="tx1"/>
           </a:solidFill>
-          <a:latin typeface="Arial" charset="0"/>
+          <a:latin typeface="Arial" panose="020B0604020202020204" pitchFamily="34" charset="0"/>
         </a:defRPr>
       </a:lvl4pPr>
       <a:lvl5pPr marL="2057400" indent="-228600" algn="l" rtl="0" eaLnBrk="0" fontAlgn="base" hangingPunct="0">
@@ -4859,7 +4645,7 @@
           <a:solidFill>
             <a:schemeClr val="tx1"/>
           </a:solidFill>
-          <a:latin typeface="Arial" charset="0"/>
+          <a:latin typeface="Arial" panose="020B0604020202020204" pitchFamily="34" charset="0"/>
         </a:defRPr>
       </a:lvl5pPr>
       <a:lvl6pPr marL="2514600" indent="-228600" algn="l" rtl="0" fontAlgn="base">
@@ -4874,7 +4660,7 @@
           <a:solidFill>
             <a:schemeClr val="tx1"/>
           </a:solidFill>
-          <a:latin typeface="Arial" charset="0"/>
+          <a:latin typeface="Arial" panose="020B0604020202020204" pitchFamily="34" charset="0"/>
         </a:defRPr>
       </a:lvl6pPr>
       <a:lvl7pPr marL="2971800" indent="-228600" algn="l" rtl="0" fontAlgn="base">
@@ -4889,7 +4675,7 @@
           <a:solidFill>
             <a:schemeClr val="tx1"/>
           </a:solidFill>
-          <a:latin typeface="Arial" charset="0"/>
+          <a:latin typeface="Arial" panose="020B0604020202020204" pitchFamily="34" charset="0"/>
         </a:defRPr>
       </a:lvl7pPr>
       <a:lvl8pPr marL="3429000" indent="-228600" algn="l" rtl="0" fontAlgn="base">
@@ -4904,7 +4690,7 @@
           <a:solidFill>
             <a:schemeClr val="tx1"/>
           </a:solidFill>
-          <a:latin typeface="Arial" charset="0"/>
+          <a:latin typeface="Arial" panose="020B0604020202020204" pitchFamily="34" charset="0"/>
         </a:defRPr>
       </a:lvl8pPr>
       <a:lvl9pPr marL="3886200" indent="-228600" algn="l" rtl="0" fontAlgn="base">
@@ -4919,7 +4705,7 @@
           <a:solidFill>
             <a:schemeClr val="tx1"/>
           </a:solidFill>
-          <a:latin typeface="Arial" charset="0"/>
+          <a:latin typeface="Arial" panose="020B0604020202020204" pitchFamily="34" charset="0"/>
         </a:defRPr>
       </a:lvl9pPr>
     </p:bodyStyle>
@@ -5066,6 +4852,7 @@
               <a:rPr lang="en-US" smtClean="0"/>
               <a:t>Seminar HĐH</a:t>
             </a:r>
+            <a:endParaRPr lang="en-US" smtClean="0"/>
           </a:p>
         </p:txBody>
       </p:sp>
@@ -5094,6 +4881,7 @@
               <a:rPr lang="en-US" dirty="0" smtClean="0"/>
               <a:t>15CLC</a:t>
             </a:r>
+            <a:endParaRPr lang="en-US" dirty="0" smtClean="0"/>
           </a:p>
         </p:txBody>
       </p:sp>
@@ -5121,8 +4909,6 @@
               <a:schemeClr val="tx1"/>
             </a:solidFill>
             <a:round/>
-            <a:headEnd/>
-            <a:tailEnd/>
           </a:ln>
           <a:effectLst>
             <a:outerShdw dist="107763" dir="13500000" algn="ctr" rotWithShape="0">
@@ -5147,6 +4933,11 @@
               </a:rPr>
               <a:t>HĐH</a:t>
             </a:r>
+            <a:endParaRPr lang="en-US" sz="4400" b="1">
+              <a:solidFill>
+                <a:srgbClr val="FC5252"/>
+              </a:solidFill>
+            </a:endParaRPr>
           </a:p>
         </p:txBody>
       </p:sp>
@@ -5170,8 +4961,6 @@
           <a:ln w="9525">
             <a:noFill/>
             <a:miter lim="800000"/>
-            <a:headEnd/>
-            <a:tailEnd/>
           </a:ln>
         </p:spPr>
         <p:txBody>
@@ -5183,31 +4972,43 @@
             <a:pPr algn="ctr"/>
             <a:r>
               <a:rPr lang="en-US" sz="2000" b="1">
-                <a:latin typeface="Verdana" pitchFamily="34" charset="0"/>
-                <a:cs typeface="Arial" charset="0"/>
+                <a:latin typeface="Verdana" panose="020B0604030504040204" pitchFamily="34" charset="0"/>
+                <a:cs typeface="Arial" panose="020B0604020202020204" pitchFamily="34" charset="0"/>
               </a:rPr>
               <a:t>Trường Đại học Khoa học Tự nhiên, ĐHQG-HCM</a:t>
             </a:r>
+            <a:endParaRPr lang="en-US" sz="2000" b="1">
+              <a:latin typeface="Verdana" panose="020B0604030504040204" pitchFamily="34" charset="0"/>
+              <a:cs typeface="Arial" panose="020B0604020202020204" pitchFamily="34" charset="0"/>
+            </a:endParaRPr>
           </a:p>
           <a:p>
             <a:pPr algn="ctr"/>
             <a:r>
               <a:rPr lang="en-US" sz="2000" b="1">
-                <a:latin typeface="Verdana" pitchFamily="34" charset="0"/>
-                <a:cs typeface="Arial" charset="0"/>
+                <a:latin typeface="Verdana" panose="020B0604030504040204" pitchFamily="34" charset="0"/>
+                <a:cs typeface="Arial" panose="020B0604020202020204" pitchFamily="34" charset="0"/>
               </a:rPr>
               <a:t>Khoa Công Nghệ Thông Tin</a:t>
             </a:r>
+            <a:endParaRPr lang="en-US" sz="2000" b="1">
+              <a:latin typeface="Verdana" panose="020B0604030504040204" pitchFamily="34" charset="0"/>
+              <a:cs typeface="Arial" panose="020B0604020202020204" pitchFamily="34" charset="0"/>
+            </a:endParaRPr>
           </a:p>
           <a:p>
             <a:pPr algn="ctr"/>
             <a:r>
               <a:rPr lang="en-US" sz="2000" b="1">
-                <a:latin typeface="Verdana" pitchFamily="34" charset="0"/>
-                <a:cs typeface="Arial" charset="0"/>
+                <a:latin typeface="Verdana" panose="020B0604030504040204" pitchFamily="34" charset="0"/>
+                <a:cs typeface="Arial" panose="020B0604020202020204" pitchFamily="34" charset="0"/>
               </a:rPr>
               <a:t>Bộ môn Mạng máy tính và Viễn thông</a:t>
             </a:r>
+            <a:endParaRPr lang="en-US" sz="2000" b="1">
+              <a:latin typeface="Verdana" panose="020B0604030504040204" pitchFamily="34" charset="0"/>
+              <a:cs typeface="Arial" panose="020B0604020202020204" pitchFamily="34" charset="0"/>
+            </a:endParaRPr>
           </a:p>
         </p:txBody>
       </p:sp>
@@ -5343,6 +5144,7 @@
               <a:rPr lang="en-US" sz="1800" dirty="0" smtClean="0"/>
               <a:t>)</a:t>
             </a:r>
+            <a:endParaRPr lang="en-US" sz="1800" dirty="0" smtClean="0"/>
           </a:p>
           <a:p>
             <a:pPr lvl="1"/>
@@ -5350,6 +5152,7 @@
               <a:rPr lang="vi-VN" sz="2400" dirty="0"/>
               <a:t>Gọi mutex-&gt;P(); để giúp tránh tình trạng nạp 2 tiến trình cùng 1 lúc.</a:t>
             </a:r>
+            <a:endParaRPr lang="vi-VN" sz="2400" dirty="0"/>
           </a:p>
           <a:p>
             <a:pPr lvl="1"/>
@@ -5357,6 +5160,7 @@
               <a:rPr lang="vi-VN" sz="2400" dirty="0"/>
               <a:t>Kiểm tra thread đã khởi tạo thành công chưa, nếu chưa thì báo lỗi là không đủ bộ nhớ, gọi mutex-&gt;V() và return.</a:t>
             </a:r>
+            <a:endParaRPr lang="vi-VN" sz="2400" dirty="0"/>
           </a:p>
           <a:p>
             <a:pPr lvl="1"/>
@@ -5364,6 +5168,7 @@
               <a:rPr lang="vi-VN" sz="2400" dirty="0"/>
               <a:t>Đặt processID của thread này là id.</a:t>
             </a:r>
+            <a:endParaRPr lang="vi-VN" sz="2400" dirty="0"/>
           </a:p>
           <a:p>
             <a:pPr lvl="1"/>
@@ -5371,6 +5176,7 @@
               <a:rPr lang="vi-VN" sz="2400" dirty="0"/>
               <a:t>Đặt parrentID của thread này là processID của thread gọi thực thi Exec</a:t>
             </a:r>
+            <a:endParaRPr lang="vi-VN" sz="2400" dirty="0"/>
           </a:p>
           <a:p>
             <a:pPr lvl="1"/>
@@ -5378,6 +5184,7 @@
               <a:rPr lang="vi-VN" sz="2400" dirty="0"/>
               <a:t>Gọi thực thi Fork(StartProcess_2,id) =&gt; Ta cast thread thành kiểu int, sau đó khi xử ký hàm StartProcess ta cast Thread về đúng kiểu của nó.</a:t>
             </a:r>
+            <a:endParaRPr lang="vi-VN" sz="2400" dirty="0"/>
           </a:p>
           <a:p>
             <a:pPr lvl="1"/>
@@ -5390,11 +5197,6 @@
         </p:txBody>
       </p:sp>
     </p:spTree>
-    <p:extLst>
-      <p:ext uri="{BB962C8B-B14F-4D97-AF65-F5344CB8AC3E}">
-        <p14:creationId xmlns:p14="http://schemas.microsoft.com/office/powerpoint/2010/main" val="3784654398"/>
-      </p:ext>
-    </p:extLst>
   </p:cSld>
   <p:clrMapOvr>
     <a:masterClrMapping/>
@@ -5485,6 +5287,7 @@
               <a:rPr lang="vi-VN" sz="2400" dirty="0"/>
               <a:t>Đọc địa chỉ tên chương trình “name” từ thanh ghi r4.</a:t>
             </a:r>
+            <a:endParaRPr lang="vi-VN" sz="2400" dirty="0"/>
           </a:p>
           <a:p>
             <a:pPr lvl="1"/>
@@ -5492,6 +5295,7 @@
               <a:rPr lang="vi-VN" sz="2400" dirty="0"/>
               <a:t>Tên chương trình lúc này đang ở trong user space. Gọi hàm User2System đã được khai báo trong lớp machine để chuyển vùng nhớ user space tới vùng nhớ system space.</a:t>
             </a:r>
+            <a:endParaRPr lang="vi-VN" sz="2400" dirty="0"/>
           </a:p>
           <a:p>
             <a:pPr lvl="1"/>
@@ -5499,6 +5303,7 @@
               <a:rPr lang="vi-VN" sz="2400" dirty="0"/>
               <a:t>Nếu bị lỗi thì báo “Không mở được file” và gán -1 vào thanh ghi 2.</a:t>
             </a:r>
+            <a:endParaRPr lang="vi-VN" sz="2400" dirty="0"/>
           </a:p>
           <a:p>
             <a:pPr lvl="1"/>
@@ -5511,11 +5316,6 @@
         </p:txBody>
       </p:sp>
     </p:spTree>
-    <p:extLst>
-      <p:ext uri="{BB962C8B-B14F-4D97-AF65-F5344CB8AC3E}">
-        <p14:creationId xmlns:p14="http://schemas.microsoft.com/office/powerpoint/2010/main" val="1451678518"/>
-      </p:ext>
-    </p:extLst>
   </p:cSld>
   <p:clrMapOvr>
     <a:masterClrMapping/>
@@ -5632,6 +5432,7 @@
               <a:rPr lang="en-US" dirty="0" smtClean="0"/>
               <a:t>:</a:t>
             </a:r>
+            <a:endParaRPr lang="en-US" dirty="0" smtClean="0"/>
           </a:p>
           <a:p>
             <a:pPr lvl="1" algn="just" eaLnBrk="1" hangingPunct="1"/>
@@ -5655,6 +5456,7 @@
               <a:rPr lang="en-US" dirty="0" smtClean="0"/>
               <a:t>		128</a:t>
             </a:r>
+            <a:endParaRPr lang="en-US" dirty="0" smtClean="0"/>
           </a:p>
           <a:p>
             <a:pPr algn="just" eaLnBrk="1" hangingPunct="1"/>
@@ -5674,6 +5476,7 @@
               <a:rPr lang="en-US" dirty="0" smtClean="0"/>
               <a:t>:</a:t>
             </a:r>
+            <a:endParaRPr lang="en-US" dirty="0" smtClean="0"/>
           </a:p>
           <a:p>
             <a:pPr lvl="1" algn="just" eaLnBrk="1" hangingPunct="1"/>
@@ -5697,6 +5500,7 @@
               <a:rPr lang="en-US" dirty="0" smtClean="0"/>
               <a:t>		512</a:t>
             </a:r>
+            <a:endParaRPr lang="en-US" dirty="0" smtClean="0"/>
           </a:p>
           <a:p>
             <a:pPr algn="just" eaLnBrk="1" hangingPunct="1"/>
@@ -5716,6 +5520,7 @@
               <a:rPr lang="en-US" dirty="0" smtClean="0"/>
               <a:t>)</a:t>
             </a:r>
+            <a:endParaRPr lang="en-US" dirty="0" smtClean="0"/>
           </a:p>
           <a:p>
             <a:pPr lvl="1" algn="just" eaLnBrk="1" hangingPunct="1"/>
@@ -5753,7 +5558,7 @@
             </a:r>
             <a:r>
               <a:rPr lang="en-US" dirty="0" smtClean="0">
-                <a:sym typeface="Wingdings" pitchFamily="2" charset="2"/>
+                <a:sym typeface="Wingdings" panose="05000000000000000000" pitchFamily="2" charset="2"/>
               </a:rPr>
               <a:t> </a:t>
             </a:r>
@@ -5773,330 +5578,331 @@
               <a:rPr lang="en-US" b="1" dirty="0" smtClean="0"/>
               <a:t> </a:t>
             </a:r>
+            <a:endParaRPr lang="en-US" b="1" dirty="0" smtClean="0"/>
           </a:p>
           <a:p>
             <a:pPr lvl="2" algn="just" eaLnBrk="1" hangingPunct="1"/>
             <a:r>
               <a:rPr lang="en-US" sz="1800" b="1" i="1" dirty="0" err="1" smtClean="0">
-                <a:sym typeface="Wingdings" pitchFamily="2" charset="2"/>
+                <a:sym typeface="Wingdings" panose="05000000000000000000" pitchFamily="2" charset="2"/>
               </a:rPr>
               <a:t>Hàm</a:t>
             </a:r>
             <a:r>
               <a:rPr lang="en-US" sz="1800" b="1" i="1" dirty="0" smtClean="0">
-                <a:sym typeface="Wingdings" pitchFamily="2" charset="2"/>
+                <a:sym typeface="Wingdings" panose="05000000000000000000" pitchFamily="2" charset="2"/>
               </a:rPr>
               <a:t> </a:t>
             </a:r>
             <a:r>
               <a:rPr lang="en-US" sz="1800" b="1" i="1" dirty="0" err="1" smtClean="0">
-                <a:sym typeface="Wingdings" pitchFamily="2" charset="2"/>
+                <a:sym typeface="Wingdings" panose="05000000000000000000" pitchFamily="2" charset="2"/>
               </a:rPr>
               <a:t>này</a:t>
             </a:r>
             <a:r>
               <a:rPr lang="en-US" sz="1800" b="1" i="1" dirty="0" smtClean="0">
-                <a:sym typeface="Wingdings" pitchFamily="2" charset="2"/>
+                <a:sym typeface="Wingdings" panose="05000000000000000000" pitchFamily="2" charset="2"/>
               </a:rPr>
               <a:t> </a:t>
             </a:r>
             <a:r>
               <a:rPr lang="en-US" sz="1800" b="1" i="1" dirty="0" err="1" smtClean="0">
-                <a:sym typeface="Wingdings" pitchFamily="2" charset="2"/>
+                <a:sym typeface="Wingdings" panose="05000000000000000000" pitchFamily="2" charset="2"/>
               </a:rPr>
               <a:t>tự</a:t>
             </a:r>
             <a:r>
               <a:rPr lang="en-US" sz="1800" b="1" i="1" dirty="0" smtClean="0">
-                <a:sym typeface="Wingdings" pitchFamily="2" charset="2"/>
+                <a:sym typeface="Wingdings" panose="05000000000000000000" pitchFamily="2" charset="2"/>
               </a:rPr>
               <a:t> </a:t>
             </a:r>
             <a:r>
               <a:rPr lang="en-US" sz="1800" b="1" i="1" dirty="0" err="1" smtClean="0">
-                <a:sym typeface="Wingdings" pitchFamily="2" charset="2"/>
+                <a:sym typeface="Wingdings" panose="05000000000000000000" pitchFamily="2" charset="2"/>
               </a:rPr>
               <a:t>viết</a:t>
             </a:r>
             <a:r>
               <a:rPr lang="en-US" sz="1800" b="1" i="1" dirty="0" smtClean="0">
-                <a:sym typeface="Wingdings" pitchFamily="2" charset="2"/>
+                <a:sym typeface="Wingdings" panose="05000000000000000000" pitchFamily="2" charset="2"/>
               </a:rPr>
               <a:t> (</a:t>
             </a:r>
             <a:r>
               <a:rPr lang="en-US" sz="1800" b="1" i="1" dirty="0" err="1" smtClean="0">
-                <a:sym typeface="Wingdings" pitchFamily="2" charset="2"/>
+                <a:sym typeface="Wingdings" panose="05000000000000000000" pitchFamily="2" charset="2"/>
               </a:rPr>
               <a:t>dùng</a:t>
             </a:r>
             <a:r>
               <a:rPr lang="en-US" sz="1800" b="1" i="1" dirty="0" smtClean="0">
-                <a:sym typeface="Wingdings" pitchFamily="2" charset="2"/>
+                <a:sym typeface="Wingdings" panose="05000000000000000000" pitchFamily="2" charset="2"/>
               </a:rPr>
               <a:t> </a:t>
             </a:r>
             <a:r>
               <a:rPr lang="en-US" sz="1800" b="1" i="1" dirty="0" err="1" smtClean="0">
-                <a:sym typeface="Wingdings" pitchFamily="2" charset="2"/>
+                <a:sym typeface="Wingdings" panose="05000000000000000000" pitchFamily="2" charset="2"/>
               </a:rPr>
               <a:t>mảng</a:t>
             </a:r>
             <a:r>
               <a:rPr lang="en-US" sz="1800" b="1" i="1" dirty="0" smtClean="0">
-                <a:sym typeface="Wingdings" pitchFamily="2" charset="2"/>
+                <a:sym typeface="Wingdings" panose="05000000000000000000" pitchFamily="2" charset="2"/>
               </a:rPr>
               <a:t> 1 </a:t>
             </a:r>
             <a:r>
               <a:rPr lang="en-US" sz="1800" b="1" i="1" dirty="0" err="1" smtClean="0">
-                <a:sym typeface="Wingdings" pitchFamily="2" charset="2"/>
+                <a:sym typeface="Wingdings" panose="05000000000000000000" pitchFamily="2" charset="2"/>
               </a:rPr>
               <a:t>chiều</a:t>
             </a:r>
             <a:r>
               <a:rPr lang="en-US" sz="1800" b="1" i="1" dirty="0" smtClean="0">
-                <a:sym typeface="Wingdings" pitchFamily="2" charset="2"/>
+                <a:sym typeface="Wingdings" panose="05000000000000000000" pitchFamily="2" charset="2"/>
               </a:rPr>
               <a:t> </a:t>
             </a:r>
             <a:r>
               <a:rPr lang="en-US" sz="1800" b="1" i="1" dirty="0" err="1" smtClean="0">
-                <a:sym typeface="Wingdings" pitchFamily="2" charset="2"/>
+                <a:sym typeface="Wingdings" panose="05000000000000000000" pitchFamily="2" charset="2"/>
               </a:rPr>
               <a:t>có</a:t>
             </a:r>
             <a:r>
               <a:rPr lang="en-US" sz="1800" b="1" i="1" dirty="0" smtClean="0">
-                <a:sym typeface="Wingdings" pitchFamily="2" charset="2"/>
+                <a:sym typeface="Wingdings" panose="05000000000000000000" pitchFamily="2" charset="2"/>
               </a:rPr>
               <a:t> </a:t>
             </a:r>
             <a:r>
               <a:rPr lang="en-US" sz="1800" b="1" i="1" dirty="0" err="1" smtClean="0">
-                <a:sym typeface="Wingdings" pitchFamily="2" charset="2"/>
+                <a:sym typeface="Wingdings" panose="05000000000000000000" pitchFamily="2" charset="2"/>
               </a:rPr>
               <a:t>giá</a:t>
             </a:r>
             <a:r>
               <a:rPr lang="en-US" sz="1800" b="1" i="1" dirty="0" smtClean="0">
-                <a:sym typeface="Wingdings" pitchFamily="2" charset="2"/>
+                <a:sym typeface="Wingdings" panose="05000000000000000000" pitchFamily="2" charset="2"/>
               </a:rPr>
               <a:t> </a:t>
             </a:r>
             <a:r>
               <a:rPr lang="en-US" sz="1800" b="1" i="1" dirty="0" err="1" smtClean="0">
-                <a:sym typeface="Wingdings" pitchFamily="2" charset="2"/>
+                <a:sym typeface="Wingdings" panose="05000000000000000000" pitchFamily="2" charset="2"/>
               </a:rPr>
               <a:t>trị</a:t>
             </a:r>
             <a:r>
               <a:rPr lang="en-US" sz="1800" b="1" i="1" dirty="0" smtClean="0">
-                <a:sym typeface="Wingdings" pitchFamily="2" charset="2"/>
+                <a:sym typeface="Wingdings" panose="05000000000000000000" pitchFamily="2" charset="2"/>
               </a:rPr>
               <a:t> 0/1 </a:t>
             </a:r>
             <a:r>
               <a:rPr lang="en-US" sz="1800" b="1" i="1" dirty="0" err="1" smtClean="0">
-                <a:sym typeface="Wingdings" pitchFamily="2" charset="2"/>
+                <a:sym typeface="Wingdings" panose="05000000000000000000" pitchFamily="2" charset="2"/>
               </a:rPr>
               <a:t>đánh</a:t>
             </a:r>
             <a:r>
               <a:rPr lang="en-US" sz="1800" b="1" i="1" dirty="0" smtClean="0">
-                <a:sym typeface="Wingdings" pitchFamily="2" charset="2"/>
+                <a:sym typeface="Wingdings" panose="05000000000000000000" pitchFamily="2" charset="2"/>
               </a:rPr>
               <a:t> </a:t>
             </a:r>
             <a:r>
               <a:rPr lang="en-US" sz="1800" b="1" i="1" dirty="0" err="1" smtClean="0">
-                <a:sym typeface="Wingdings" pitchFamily="2" charset="2"/>
+                <a:sym typeface="Wingdings" panose="05000000000000000000" pitchFamily="2" charset="2"/>
               </a:rPr>
               <a:t>dấu</a:t>
             </a:r>
             <a:r>
               <a:rPr lang="en-US" sz="1800" b="1" i="1" dirty="0" smtClean="0">
-                <a:sym typeface="Wingdings" pitchFamily="2" charset="2"/>
+                <a:sym typeface="Wingdings" panose="05000000000000000000" pitchFamily="2" charset="2"/>
               </a:rPr>
               <a:t> </a:t>
             </a:r>
             <a:r>
               <a:rPr lang="en-US" sz="1800" b="1" i="1" dirty="0" err="1" smtClean="0">
-                <a:sym typeface="Wingdings" pitchFamily="2" charset="2"/>
+                <a:sym typeface="Wingdings" panose="05000000000000000000" pitchFamily="2" charset="2"/>
               </a:rPr>
               <a:t>vùng</a:t>
             </a:r>
             <a:r>
               <a:rPr lang="en-US" sz="1800" b="1" i="1" dirty="0" smtClean="0">
-                <a:sym typeface="Wingdings" pitchFamily="2" charset="2"/>
+                <a:sym typeface="Wingdings" panose="05000000000000000000" pitchFamily="2" charset="2"/>
               </a:rPr>
               <a:t> </a:t>
             </a:r>
             <a:r>
               <a:rPr lang="en-US" sz="1800" b="1" i="1" dirty="0" err="1" smtClean="0">
-                <a:sym typeface="Wingdings" pitchFamily="2" charset="2"/>
+                <a:sym typeface="Wingdings" panose="05000000000000000000" pitchFamily="2" charset="2"/>
               </a:rPr>
               <a:t>nhớ</a:t>
             </a:r>
             <a:r>
               <a:rPr lang="en-US" sz="1800" b="1" i="1" dirty="0" smtClean="0">
-                <a:sym typeface="Wingdings" pitchFamily="2" charset="2"/>
+                <a:sym typeface="Wingdings" panose="05000000000000000000" pitchFamily="2" charset="2"/>
               </a:rPr>
               <a:t> </a:t>
             </a:r>
             <a:r>
               <a:rPr lang="en-US" sz="1800" b="1" i="1" dirty="0" err="1" smtClean="0">
-                <a:sym typeface="Wingdings" pitchFamily="2" charset="2"/>
+                <a:sym typeface="Wingdings" panose="05000000000000000000" pitchFamily="2" charset="2"/>
               </a:rPr>
               <a:t>physicalPage</a:t>
             </a:r>
             <a:r>
               <a:rPr lang="en-US" sz="1800" b="1" i="1" dirty="0" smtClean="0">
-                <a:sym typeface="Wingdings" pitchFamily="2" charset="2"/>
+                <a:sym typeface="Wingdings" panose="05000000000000000000" pitchFamily="2" charset="2"/>
               </a:rPr>
               <a:t> </a:t>
             </a:r>
             <a:r>
               <a:rPr lang="en-US" sz="1800" b="1" i="1" dirty="0" err="1" smtClean="0">
-                <a:sym typeface="Wingdings" pitchFamily="2" charset="2"/>
+                <a:sym typeface="Wingdings" panose="05000000000000000000" pitchFamily="2" charset="2"/>
               </a:rPr>
               <a:t>đã</a:t>
             </a:r>
             <a:r>
               <a:rPr lang="en-US" sz="1800" b="1" i="1" dirty="0" smtClean="0">
-                <a:sym typeface="Wingdings" pitchFamily="2" charset="2"/>
+                <a:sym typeface="Wingdings" panose="05000000000000000000" pitchFamily="2" charset="2"/>
               </a:rPr>
               <a:t> </a:t>
             </a:r>
             <a:r>
               <a:rPr lang="en-US" sz="1800" b="1" i="1" dirty="0" err="1" smtClean="0">
-                <a:sym typeface="Wingdings" pitchFamily="2" charset="2"/>
+                <a:sym typeface="Wingdings" panose="05000000000000000000" pitchFamily="2" charset="2"/>
               </a:rPr>
               <a:t>được</a:t>
             </a:r>
             <a:r>
               <a:rPr lang="en-US" sz="1800" b="1" i="1" dirty="0" smtClean="0">
-                <a:sym typeface="Wingdings" pitchFamily="2" charset="2"/>
+                <a:sym typeface="Wingdings" panose="05000000000000000000" pitchFamily="2" charset="2"/>
               </a:rPr>
               <a:t> </a:t>
             </a:r>
             <a:r>
               <a:rPr lang="en-US" sz="1800" b="1" i="1" dirty="0" err="1" smtClean="0">
-                <a:sym typeface="Wingdings" pitchFamily="2" charset="2"/>
+                <a:sym typeface="Wingdings" panose="05000000000000000000" pitchFamily="2" charset="2"/>
               </a:rPr>
               <a:t>dùng</a:t>
             </a:r>
             <a:r>
               <a:rPr lang="en-US" sz="1800" b="1" i="1" dirty="0" smtClean="0">
-                <a:sym typeface="Wingdings" pitchFamily="2" charset="2"/>
+                <a:sym typeface="Wingdings" panose="05000000000000000000" pitchFamily="2" charset="2"/>
               </a:rPr>
               <a:t> hay </a:t>
             </a:r>
             <a:r>
               <a:rPr lang="en-US" sz="1800" b="1" i="1" dirty="0" err="1" smtClean="0">
-                <a:sym typeface="Wingdings" pitchFamily="2" charset="2"/>
+                <a:sym typeface="Wingdings" panose="05000000000000000000" pitchFamily="2" charset="2"/>
               </a:rPr>
               <a:t>chưa</a:t>
             </a:r>
             <a:r>
               <a:rPr lang="en-US" sz="1800" b="1" i="1" dirty="0" smtClean="0">
-                <a:sym typeface="Wingdings" pitchFamily="2" charset="2"/>
+                <a:sym typeface="Wingdings" panose="05000000000000000000" pitchFamily="2" charset="2"/>
               </a:rPr>
               <a:t>)  </a:t>
             </a:r>
             <a:r>
               <a:rPr lang="en-US" sz="1800" b="1" i="1" dirty="0" err="1" smtClean="0">
-                <a:sym typeface="Wingdings" pitchFamily="2" charset="2"/>
+                <a:sym typeface="Wingdings" panose="05000000000000000000" pitchFamily="2" charset="2"/>
               </a:rPr>
               <a:t>dùng</a:t>
             </a:r>
             <a:r>
               <a:rPr lang="en-US" sz="1800" b="1" i="1" dirty="0" smtClean="0">
-                <a:sym typeface="Wingdings" pitchFamily="2" charset="2"/>
+                <a:sym typeface="Wingdings" panose="05000000000000000000" pitchFamily="2" charset="2"/>
               </a:rPr>
               <a:t> </a:t>
             </a:r>
             <a:r>
               <a:rPr lang="en-US" sz="1800" b="1" i="1" dirty="0" err="1" smtClean="0">
-                <a:sym typeface="Wingdings" pitchFamily="2" charset="2"/>
+                <a:sym typeface="Wingdings" panose="05000000000000000000" pitchFamily="2" charset="2"/>
               </a:rPr>
               <a:t>các</a:t>
             </a:r>
             <a:r>
               <a:rPr lang="en-US" sz="1800" b="1" i="1" dirty="0" smtClean="0">
-                <a:sym typeface="Wingdings" pitchFamily="2" charset="2"/>
+                <a:sym typeface="Wingdings" panose="05000000000000000000" pitchFamily="2" charset="2"/>
               </a:rPr>
               <a:t> </a:t>
             </a:r>
             <a:r>
               <a:rPr lang="en-US" sz="1800" b="1" i="1" dirty="0" err="1" smtClean="0">
-                <a:sym typeface="Wingdings" pitchFamily="2" charset="2"/>
+                <a:sym typeface="Wingdings" panose="05000000000000000000" pitchFamily="2" charset="2"/>
               </a:rPr>
               <a:t>hàm</a:t>
             </a:r>
             <a:r>
               <a:rPr lang="en-US" sz="1800" b="1" i="1" dirty="0" smtClean="0">
-                <a:sym typeface="Wingdings" pitchFamily="2" charset="2"/>
+                <a:sym typeface="Wingdings" panose="05000000000000000000" pitchFamily="2" charset="2"/>
               </a:rPr>
               <a:t> Find, Mark, Clear, </a:t>
             </a:r>
             <a:r>
               <a:rPr lang="en-US" sz="1800" b="1" i="1" dirty="0" err="1" smtClean="0">
-                <a:sym typeface="Wingdings" pitchFamily="2" charset="2"/>
+                <a:sym typeface="Wingdings" panose="05000000000000000000" pitchFamily="2" charset="2"/>
               </a:rPr>
               <a:t>NumClear</a:t>
             </a:r>
             <a:r>
               <a:rPr lang="en-US" sz="1800" b="1" i="1" dirty="0" smtClean="0">
-                <a:sym typeface="Wingdings" pitchFamily="2" charset="2"/>
+                <a:sym typeface="Wingdings" panose="05000000000000000000" pitchFamily="2" charset="2"/>
               </a:rPr>
               <a:t>… </a:t>
             </a:r>
             <a:r>
               <a:rPr lang="en-US" sz="1800" b="1" i="1" dirty="0" err="1" smtClean="0">
-                <a:sym typeface="Wingdings" pitchFamily="2" charset="2"/>
+                <a:sym typeface="Wingdings" panose="05000000000000000000" pitchFamily="2" charset="2"/>
               </a:rPr>
               <a:t>của</a:t>
             </a:r>
             <a:r>
               <a:rPr lang="en-US" sz="1800" b="1" i="1" dirty="0" smtClean="0">
-                <a:sym typeface="Wingdings" pitchFamily="2" charset="2"/>
+                <a:sym typeface="Wingdings" panose="05000000000000000000" pitchFamily="2" charset="2"/>
               </a:rPr>
               <a:t> </a:t>
             </a:r>
             <a:r>
               <a:rPr lang="en-US" sz="1800" b="1" i="1" dirty="0" err="1" smtClean="0">
-                <a:sym typeface="Wingdings" pitchFamily="2" charset="2"/>
+                <a:sym typeface="Wingdings" panose="05000000000000000000" pitchFamily="2" charset="2"/>
               </a:rPr>
               <a:t>lớp</a:t>
             </a:r>
             <a:r>
               <a:rPr lang="en-US" sz="1800" b="1" i="1" dirty="0" smtClean="0">
-                <a:sym typeface="Wingdings" pitchFamily="2" charset="2"/>
+                <a:sym typeface="Wingdings" panose="05000000000000000000" pitchFamily="2" charset="2"/>
               </a:rPr>
               <a:t> Bitmap (</a:t>
             </a:r>
             <a:r>
               <a:rPr lang="en-US" sz="1800" b="1" i="1" dirty="0" err="1" smtClean="0">
-                <a:sym typeface="Wingdings" pitchFamily="2" charset="2"/>
+                <a:sym typeface="Wingdings" panose="05000000000000000000" pitchFamily="2" charset="2"/>
               </a:rPr>
               <a:t>Bitmap.h</a:t>
             </a:r>
             <a:r>
               <a:rPr lang="en-US" sz="1800" b="1" i="1" dirty="0" smtClean="0">
-                <a:sym typeface="Wingdings" pitchFamily="2" charset="2"/>
+                <a:sym typeface="Wingdings" panose="05000000000000000000" pitchFamily="2" charset="2"/>
               </a:rPr>
               <a:t> </a:t>
             </a:r>
             <a:r>
               <a:rPr lang="en-US" sz="1800" b="1" i="1" dirty="0" err="1" smtClean="0">
-                <a:sym typeface="Wingdings" pitchFamily="2" charset="2"/>
+                <a:sym typeface="Wingdings" panose="05000000000000000000" pitchFamily="2" charset="2"/>
               </a:rPr>
               <a:t>và</a:t>
             </a:r>
             <a:r>
               <a:rPr lang="en-US" sz="1800" b="1" i="1" dirty="0" smtClean="0">
-                <a:sym typeface="Wingdings" pitchFamily="2" charset="2"/>
+                <a:sym typeface="Wingdings" panose="05000000000000000000" pitchFamily="2" charset="2"/>
               </a:rPr>
               <a:t> Bitmap.cpp)</a:t>
             </a:r>
@@ -6182,6 +5988,7 @@
               <a:rPr lang="en-US" dirty="0" smtClean="0"/>
               <a:t> addrspace.cpp:</a:t>
             </a:r>
+            <a:endParaRPr lang="en-US" dirty="0" smtClean="0"/>
           </a:p>
           <a:p>
             <a:pPr lvl="1"/>
@@ -6201,6 +6008,7 @@
               <a:rPr lang="en-US" dirty="0" smtClean="0"/>
               <a:t> code</a:t>
             </a:r>
+            <a:endParaRPr lang="en-US" dirty="0" smtClean="0"/>
           </a:p>
           <a:p>
             <a:pPr lvl="1"/>
@@ -6298,55 +6106,55 @@
             </a:r>
             <a:r>
               <a:rPr lang="en-US" dirty="0" smtClean="0">
-                <a:sym typeface="Wingdings" pitchFamily="2" charset="2"/>
+                <a:sym typeface="Wingdings" panose="05000000000000000000" pitchFamily="2" charset="2"/>
               </a:rPr>
               <a:t> </a:t>
             </a:r>
             <a:r>
               <a:rPr lang="en-US" dirty="0" err="1" smtClean="0">
-                <a:sym typeface="Wingdings" pitchFamily="2" charset="2"/>
+                <a:sym typeface="Wingdings" panose="05000000000000000000" pitchFamily="2" charset="2"/>
               </a:rPr>
               <a:t>tham</a:t>
             </a:r>
             <a:r>
               <a:rPr lang="en-US" dirty="0" smtClean="0">
-                <a:sym typeface="Wingdings" pitchFamily="2" charset="2"/>
+                <a:sym typeface="Wingdings" panose="05000000000000000000" pitchFamily="2" charset="2"/>
               </a:rPr>
               <a:t> </a:t>
             </a:r>
             <a:r>
               <a:rPr lang="en-US" dirty="0" err="1" smtClean="0">
-                <a:sym typeface="Wingdings" pitchFamily="2" charset="2"/>
+                <a:sym typeface="Wingdings" panose="05000000000000000000" pitchFamily="2" charset="2"/>
               </a:rPr>
               <a:t>khảo</a:t>
             </a:r>
             <a:r>
               <a:rPr lang="en-US" dirty="0" smtClean="0">
-                <a:sym typeface="Wingdings" pitchFamily="2" charset="2"/>
+                <a:sym typeface="Wingdings" panose="05000000000000000000" pitchFamily="2" charset="2"/>
               </a:rPr>
               <a:t> </a:t>
             </a:r>
             <a:r>
               <a:rPr lang="en-US" dirty="0" err="1" smtClean="0">
-                <a:sym typeface="Wingdings" pitchFamily="2" charset="2"/>
+                <a:sym typeface="Wingdings" panose="05000000000000000000" pitchFamily="2" charset="2"/>
               </a:rPr>
               <a:t>trong</a:t>
             </a:r>
             <a:r>
               <a:rPr lang="en-US" dirty="0" smtClean="0">
-                <a:sym typeface="Wingdings" pitchFamily="2" charset="2"/>
+                <a:sym typeface="Wingdings" panose="05000000000000000000" pitchFamily="2" charset="2"/>
               </a:rPr>
               <a:t> file </a:t>
             </a:r>
             <a:r>
               <a:rPr lang="en-US" dirty="0" err="1" smtClean="0">
-                <a:sym typeface="Wingdings" pitchFamily="2" charset="2"/>
+                <a:sym typeface="Wingdings" panose="05000000000000000000" pitchFamily="2" charset="2"/>
               </a:rPr>
               <a:t>pdf</a:t>
             </a:r>
             <a:r>
               <a:rPr lang="en-US" dirty="0" smtClean="0">
-                <a:sym typeface="Wingdings" pitchFamily="2" charset="2"/>
+                <a:sym typeface="Wingdings" panose="05000000000000000000" pitchFamily="2" charset="2"/>
               </a:rPr>
               <a:t>.</a:t>
             </a:r>
@@ -6428,6 +6236,7 @@
               <a:rPr lang="en-US" dirty="0" smtClean="0"/>
               <a:t>{</a:t>
             </a:r>
+            <a:endParaRPr lang="en-US" dirty="0" smtClean="0"/>
           </a:p>
           <a:p>
             <a:r>
@@ -6450,6 +6259,7 @@
               <a:rPr lang="en-US" dirty="0" smtClean="0"/>
               <a:t>: not enough memory for new process..!");</a:t>
             </a:r>
+            <a:endParaRPr lang="en-US" dirty="0" smtClean="0"/>
           </a:p>
           <a:p>
             <a:r>
@@ -6464,12 +6274,14 @@
               <a:rPr lang="en-US" dirty="0" smtClean="0"/>
               <a:t> = 0;</a:t>
             </a:r>
+            <a:endParaRPr lang="en-US" dirty="0" smtClean="0"/>
           </a:p>
           <a:p>
             <a:r>
               <a:rPr lang="en-US" dirty="0" smtClean="0"/>
               <a:t>     delete executable;</a:t>
             </a:r>
+            <a:endParaRPr lang="en-US" dirty="0" smtClean="0"/>
           </a:p>
           <a:p>
             <a:r>
@@ -6484,18 +6296,21 @@
               <a:rPr lang="en-US" dirty="0" smtClean="0"/>
               <a:t>-&gt;Release();</a:t>
             </a:r>
+            <a:endParaRPr lang="en-US" dirty="0" smtClean="0"/>
           </a:p>
           <a:p>
             <a:r>
               <a:rPr lang="en-US" dirty="0" smtClean="0"/>
               <a:t>     return ;</a:t>
             </a:r>
+            <a:endParaRPr lang="en-US" dirty="0" smtClean="0"/>
           </a:p>
           <a:p>
             <a:r>
               <a:rPr lang="en-US" dirty="0" smtClean="0"/>
               <a:t>}</a:t>
             </a:r>
+            <a:endParaRPr lang="en-US" dirty="0" smtClean="0"/>
           </a:p>
           <a:p>
             <a:r>
@@ -6954,6 +6769,7 @@
               <a:rPr lang="en-US" sz="2200" dirty="0" smtClean="0"/>
               <a:t> ở </a:t>
             </a:r>
+            <a:endParaRPr lang="en-US" sz="2200" dirty="0" smtClean="0"/>
           </a:p>
           <a:p>
             <a:pPr lvl="2" eaLnBrk="1" hangingPunct="1"/>
@@ -7009,6 +6825,7 @@
               <a:rPr lang="en-US" sz="2200" dirty="0" smtClean="0"/>
               <a:t> blocking</a:t>
             </a:r>
+            <a:endParaRPr lang="en-US" sz="2200" dirty="0" smtClean="0"/>
           </a:p>
           <a:p>
             <a:pPr lvl="2" eaLnBrk="1" hangingPunct="1"/>
@@ -7633,6 +7450,7 @@
               <a:rPr lang="en-US" dirty="0" smtClean="0"/>
               <a:t> context-switching</a:t>
             </a:r>
+            <a:endParaRPr lang="en-US" dirty="0" smtClean="0"/>
           </a:p>
         </p:txBody>
       </p:sp>
@@ -7763,6 +7581,7 @@
               <a:rPr lang="en-US" sz="1800" dirty="0" smtClean="0"/>
               <a:t> Ping</a:t>
             </a:r>
+            <a:endParaRPr lang="en-US" sz="1800" dirty="0" smtClean="0"/>
           </a:p>
           <a:p>
             <a:pPr marL="457200" lvl="1" indent="0">
@@ -7780,6 +7599,7 @@
               <a:rPr lang="en-US" sz="1800" dirty="0" smtClean="0"/>
               <a:t>“</a:t>
             </a:r>
+            <a:endParaRPr lang="en-US" sz="1800" dirty="0" smtClean="0"/>
           </a:p>
           <a:p>
             <a:pPr marL="457200" lvl="1" indent="0">
@@ -7797,6 +7617,7 @@
               <a:rPr lang="en-US" sz="1800" dirty="0" smtClean="0"/>
               <a:t>()</a:t>
             </a:r>
+            <a:endParaRPr lang="en-US" sz="1800" dirty="0" smtClean="0"/>
           </a:p>
           <a:p>
             <a:pPr marL="457200" lvl="1" indent="0">
@@ -7888,6 +7709,7 @@
               <a:rPr lang="en-US" sz="1800" dirty="0" smtClean="0"/>
               <a:t>');</a:t>
             </a:r>
+            <a:endParaRPr lang="en-US" sz="1800" dirty="0" smtClean="0"/>
           </a:p>
           <a:p>
             <a:pPr marL="514350" lvl="1" indent="0">
@@ -7897,6 +7719,7 @@
               <a:rPr lang="en-US" sz="1800" dirty="0" smtClean="0"/>
               <a:t>}</a:t>
             </a:r>
+            <a:endParaRPr lang="en-US" sz="1800" dirty="0" smtClean="0"/>
           </a:p>
           <a:p>
             <a:r>
@@ -7937,6 +7760,7 @@
               <a:rPr lang="en-US" sz="1800" dirty="0"/>
               <a:t>“</a:t>
             </a:r>
+            <a:endParaRPr lang="en-US" sz="1800" dirty="0"/>
           </a:p>
           <a:p>
             <a:pPr marL="457200" lvl="1" indent="0">
@@ -7946,6 +7770,7 @@
               <a:rPr lang="en-US" sz="1800" dirty="0"/>
               <a:t>void main()</a:t>
             </a:r>
+            <a:endParaRPr lang="en-US" sz="1800" dirty="0"/>
           </a:p>
           <a:p>
             <a:pPr marL="457200" lvl="1" indent="0">
@@ -7955,6 +7780,7 @@
               <a:rPr lang="en-US" sz="1800" dirty="0"/>
               <a:t>{	</a:t>
             </a:r>
+            <a:endParaRPr lang="en-US" sz="1800" dirty="0"/>
           </a:p>
           <a:p>
             <a:pPr marL="914400" lvl="2" indent="0">
@@ -7976,6 +7802,7 @@
               <a:rPr lang="en-US" sz="1800" dirty="0"/>
               <a:t>;	</a:t>
             </a:r>
+            <a:endParaRPr lang="en-US" sz="1800" dirty="0"/>
           </a:p>
           <a:p>
             <a:pPr marL="914400" lvl="2" indent="0">
@@ -8009,6 +7836,7 @@
               <a:rPr lang="en-US" sz="1800" dirty="0"/>
               <a:t>++)		</a:t>
             </a:r>
+            <a:endParaRPr lang="en-US" sz="1800" dirty="0"/>
           </a:p>
           <a:p>
             <a:pPr marL="1828800" lvl="4" indent="0">
@@ -8032,6 +7860,7 @@
               <a:rPr lang="en-US" sz="1800" dirty="0"/>
               <a:t>}</a:t>
             </a:r>
+            <a:endParaRPr lang="en-US" sz="1800" dirty="0"/>
           </a:p>
           <a:p>
             <a:pPr marL="514350" lvl="1" indent="0">
@@ -8042,11 +7871,6 @@
         </p:txBody>
       </p:sp>
     </p:spTree>
-    <p:extLst>
-      <p:ext uri="{BB962C8B-B14F-4D97-AF65-F5344CB8AC3E}">
-        <p14:creationId xmlns:p14="http://schemas.microsoft.com/office/powerpoint/2010/main" val="3392401818"/>
-      </p:ext>
-    </p:extLst>
   </p:cSld>
   <p:clrMapOvr>
     <a:masterClrMapping/>
@@ -8133,6 +7957,7 @@
               <a:rPr lang="en-US" dirty="0"/>
               <a:t> nachos</a:t>
             </a:r>
+            <a:endParaRPr lang="en-US" dirty="0"/>
           </a:p>
         </p:txBody>
       </p:sp>
@@ -8219,6 +8044,7 @@
               <a:rPr lang="en-US" sz="1700" dirty="0" smtClean="0"/>
               <a:t>“</a:t>
             </a:r>
+            <a:endParaRPr lang="en-US" sz="1700" dirty="0" smtClean="0"/>
           </a:p>
           <a:p>
             <a:pPr>
@@ -8286,6 +8112,7 @@
               <a:rPr lang="en-US" sz="1700" dirty="0" smtClean="0"/>
               <a:t>");</a:t>
             </a:r>
+            <a:endParaRPr lang="en-US" sz="1700" dirty="0" smtClean="0"/>
           </a:p>
           <a:p>
             <a:pPr>
@@ -8472,11 +8299,6 @@
         </p:txBody>
       </p:sp>
     </p:spTree>
-    <p:extLst>
-      <p:ext uri="{BB962C8B-B14F-4D97-AF65-F5344CB8AC3E}">
-        <p14:creationId xmlns:p14="http://schemas.microsoft.com/office/powerpoint/2010/main" val="548503936"/>
-      </p:ext>
-    </p:extLst>
   </p:cSld>
   <p:clrMapOvr>
     <a:masterClrMapping/>
@@ -8537,6 +8359,7 @@
               <a:rPr lang="en-US" sz="1400" b="1" smtClean="0"/>
               <a:t>fit.hcmuns.edu.vn</a:t>
             </a:r>
+            <a:endParaRPr lang="en-US" sz="1400" b="1" smtClean="0"/>
           </a:p>
         </p:txBody>
       </p:sp>
@@ -8575,8 +8398,6 @@
                     <a:schemeClr val="bg1"/>
                   </a:solidFill>
                   <a:round/>
-                  <a:headEnd/>
-                  <a:tailEnd/>
                 </a:ln>
                 <a:gradFill rotWithShape="1">
                   <a:gsLst>
@@ -8596,11 +8417,39 @@
                     </a:srgbClr>
                   </a:outerShdw>
                 </a:effectLst>
-                <a:latin typeface="Arial"/>
-                <a:cs typeface="Arial"/>
+                <a:latin typeface="Arial" panose="020B0604020202020204"/>
+                <a:cs typeface="Arial" panose="020B0604020202020204"/>
               </a:rPr>
               <a:t>Thank You !</a:t>
             </a:r>
+            <a:endParaRPr lang="en-US" sz="3600" b="1" kern="10">
+              <a:ln w="19050">
+                <a:solidFill>
+                  <a:schemeClr val="bg1"/>
+                </a:solidFill>
+                <a:round/>
+              </a:ln>
+              <a:gradFill rotWithShape="1">
+                <a:gsLst>
+                  <a:gs pos="0">
+                    <a:schemeClr val="tx2"/>
+                  </a:gs>
+                  <a:gs pos="100000">
+                    <a:schemeClr val="hlink"/>
+                  </a:gs>
+                </a:gsLst>
+                <a:lin ang="0" scaled="1"/>
+              </a:gradFill>
+              <a:effectLst>
+                <a:outerShdw dist="63500" dir="2212194" algn="ctr" rotWithShape="0">
+                  <a:srgbClr val="868686">
+                    <a:alpha val="50000"/>
+                  </a:srgbClr>
+                </a:outerShdw>
+              </a:effectLst>
+              <a:latin typeface="Arial" panose="020B0604020202020204"/>
+              <a:cs typeface="Arial" panose="020B0604020202020204"/>
+            </a:endParaRPr>
           </a:p>
         </p:txBody>
       </p:sp>
@@ -8628,8 +8477,6 @@
               <a:schemeClr val="tx1"/>
             </a:solidFill>
             <a:round/>
-            <a:headEnd/>
-            <a:tailEnd/>
           </a:ln>
           <a:effectLst>
             <a:outerShdw dist="107763" dir="13500000" algn="ctr" rotWithShape="0">
@@ -8654,6 +8501,11 @@
               </a:rPr>
               <a:t>HĐH</a:t>
             </a:r>
+            <a:endParaRPr lang="en-US" sz="4400" b="1">
+              <a:solidFill>
+                <a:srgbClr val="FC5252"/>
+              </a:solidFill>
+            </a:endParaRPr>
           </a:p>
         </p:txBody>
       </p:sp>
@@ -8686,7 +8538,7 @@
                             </p:stCondLst>
                             <p:childTnLst>
                               <p:par>
-                                <p:cTn id="5" presetID="53" presetClass="entr" presetSubtype="0" fill="hold" grpId="0" nodeType="afterEffect">
+                                <p:cTn id="5" presetID="53" presetClass="entr" presetSubtype="16" fill="hold" grpId="0" nodeType="afterEffect">
                                   <p:stCondLst>
                                     <p:cond delay="0"/>
                                   </p:stCondLst>
@@ -9002,8 +8854,6 @@
           <a:ln w="9525" algn="ctr">
             <a:noFill/>
             <a:miter lim="800000"/>
-            <a:headEnd/>
-            <a:tailEnd/>
           </a:ln>
           <a:effectLst/>
         </p:spPr>
@@ -9105,8 +8955,6 @@
           <a:ln w="0" algn="ctr">
             <a:noFill/>
             <a:miter lim="800000"/>
-            <a:headEnd/>
-            <a:tailEnd/>
           </a:ln>
         </p:spPr>
         <p:txBody>
@@ -9141,8 +8989,6 @@
               <a:schemeClr val="bg2"/>
             </a:solidFill>
             <a:round/>
-            <a:headEnd/>
-            <a:tailEnd/>
           </a:ln>
         </p:spPr>
         <p:txBody>
@@ -9214,8 +9060,6 @@
               <a:schemeClr val="bg2"/>
             </a:solidFill>
             <a:round/>
-            <a:headEnd/>
-            <a:tailEnd/>
           </a:ln>
         </p:spPr>
         <p:txBody>
@@ -9227,15 +9071,14 @@
               <a:rPr lang="en-US" sz="2400" b="1"/>
               <a:t>Các system call mới</a:t>
             </a:r>
+            <a:endParaRPr lang="en-US" sz="2400" b="1"/>
           </a:p>
         </p:txBody>
       </p:sp>
       <p:grpSp>
         <p:nvGrpSpPr>
           <p:cNvPr id="4104" name="Group 8"/>
-          <p:cNvGrpSpPr>
-            <a:grpSpLocks/>
-          </p:cNvGrpSpPr>
+          <p:cNvGrpSpPr/>
           <p:nvPr/>
         </p:nvGrpSpPr>
         <p:grpSpPr bwMode="auto">
@@ -9279,8 +9122,6 @@
             <a:ln w="57150" algn="ctr">
               <a:noFill/>
               <a:round/>
-              <a:headEnd/>
-              <a:tailEnd/>
             </a:ln>
           </p:spPr>
           <p:txBody>
@@ -9324,8 +9165,6 @@
             <a:ln w="9525" algn="ctr">
               <a:noFill/>
               <a:round/>
-              <a:headEnd/>
-              <a:tailEnd/>
             </a:ln>
           </p:spPr>
           <p:txBody>
@@ -9377,8 +9216,6 @@
             <a:ln w="38100" algn="ctr">
               <a:noFill/>
               <a:round/>
-              <a:headEnd/>
-              <a:tailEnd/>
             </a:ln>
             <a:effectLst/>
           </p:spPr>
@@ -9425,8 +9262,6 @@
             <a:ln w="38100" algn="ctr">
               <a:noFill/>
               <a:round/>
-              <a:headEnd/>
-              <a:tailEnd/>
             </a:ln>
           </p:spPr>
           <p:txBody>
@@ -9480,8 +9315,6 @@
             <a:ln w="38100" algn="ctr">
               <a:noFill/>
               <a:round/>
-              <a:headEnd/>
-              <a:tailEnd/>
             </a:ln>
             <a:effectLst/>
           </p:spPr>
@@ -9528,8 +9361,6 @@
             <a:ln w="38100" algn="ctr">
               <a:noFill/>
               <a:round/>
-              <a:headEnd/>
-              <a:tailEnd/>
             </a:ln>
           </p:spPr>
           <p:txBody>
@@ -9546,9 +9377,7 @@
       <p:grpSp>
         <p:nvGrpSpPr>
           <p:cNvPr id="4105" name="Group 15"/>
-          <p:cNvGrpSpPr>
-            <a:grpSpLocks/>
-          </p:cNvGrpSpPr>
+          <p:cNvGrpSpPr/>
           <p:nvPr/>
         </p:nvGrpSpPr>
         <p:grpSpPr bwMode="auto">
@@ -9592,8 +9421,6 @@
             <a:ln w="57150" algn="ctr">
               <a:noFill/>
               <a:round/>
-              <a:headEnd/>
-              <a:tailEnd/>
             </a:ln>
           </p:spPr>
           <p:txBody>
@@ -9637,8 +9464,6 @@
             <a:ln w="9525" algn="ctr">
               <a:noFill/>
               <a:round/>
-              <a:headEnd/>
-              <a:tailEnd/>
             </a:ln>
           </p:spPr>
           <p:txBody>
@@ -9690,8 +9515,6 @@
             <a:ln w="38100" algn="ctr">
               <a:noFill/>
               <a:round/>
-              <a:headEnd/>
-              <a:tailEnd/>
             </a:ln>
             <a:effectLst/>
           </p:spPr>
@@ -9738,8 +9561,6 @@
             <a:ln w="38100" algn="ctr">
               <a:noFill/>
               <a:round/>
-              <a:headEnd/>
-              <a:tailEnd/>
             </a:ln>
           </p:spPr>
           <p:txBody>
@@ -9793,8 +9614,6 @@
             <a:ln w="38100" algn="ctr">
               <a:noFill/>
               <a:round/>
-              <a:headEnd/>
-              <a:tailEnd/>
             </a:ln>
             <a:effectLst/>
           </p:spPr>
@@ -9841,8 +9660,6 @@
             <a:ln w="38100" algn="ctr">
               <a:noFill/>
               <a:round/>
-              <a:headEnd/>
-              <a:tailEnd/>
             </a:ln>
           </p:spPr>
           <p:txBody>
@@ -9878,8 +9695,6 @@
           <a:ln w="9525">
             <a:noFill/>
             <a:miter lim="800000"/>
-            <a:headEnd/>
-            <a:tailEnd/>
           </a:ln>
         </p:spPr>
         <p:txBody>
@@ -9898,10 +9713,16 @@
                 <a:solidFill>
                   <a:schemeClr val="bg1"/>
                 </a:solidFill>
-                <a:latin typeface="Verdana" pitchFamily="34" charset="0"/>
+                <a:latin typeface="Verdana" panose="020B0604030504040204" pitchFamily="34" charset="0"/>
               </a:rPr>
               <a:t>fit.hcmuns.edu.vn</a:t>
             </a:r>
+            <a:endParaRPr lang="en-US" sz="1100" b="1">
+              <a:solidFill>
+                <a:schemeClr val="bg1"/>
+              </a:solidFill>
+              <a:latin typeface="Verdana" panose="020B0604030504040204" pitchFamily="34" charset="0"/>
+            </a:endParaRPr>
           </a:p>
         </p:txBody>
       </p:sp>
@@ -9927,8 +9748,6 @@
           <a:ln w="9525">
             <a:noFill/>
             <a:miter lim="800000"/>
-            <a:headEnd/>
-            <a:tailEnd/>
           </a:ln>
         </p:spPr>
         <p:txBody>
@@ -9944,10 +9763,13 @@
             </a:pPr>
             <a:r>
               <a:rPr lang="en-US" sz="1200" b="1">
-                <a:latin typeface="Verdana" pitchFamily="34" charset="0"/>
+                <a:latin typeface="Verdana" panose="020B0604030504040204" pitchFamily="34" charset="0"/>
               </a:rPr>
               <a:t>CNTT-KHTN</a:t>
             </a:r>
+            <a:endParaRPr lang="en-US" sz="1200" b="1">
+              <a:latin typeface="Verdana" panose="020B0604030504040204" pitchFamily="34" charset="0"/>
+            </a:endParaRPr>
           </a:p>
         </p:txBody>
       </p:sp>
@@ -9975,8 +9797,6 @@
               <a:schemeClr val="tx1"/>
             </a:solidFill>
             <a:round/>
-            <a:headEnd/>
-            <a:tailEnd/>
           </a:ln>
         </p:spPr>
         <p:txBody>
@@ -9992,6 +9812,11 @@
               </a:rPr>
               <a:t>HĐH</a:t>
             </a:r>
+            <a:endParaRPr lang="en-US" sz="1400" b="1">
+              <a:solidFill>
+                <a:srgbClr val="FC5252"/>
+              </a:solidFill>
+            </a:endParaRPr>
           </a:p>
         </p:txBody>
       </p:sp>
@@ -10019,8 +9844,6 @@
               <a:schemeClr val="bg2"/>
             </a:solidFill>
             <a:round/>
-            <a:headEnd/>
-            <a:tailEnd/>
           </a:ln>
         </p:spPr>
         <p:txBody>
@@ -10060,15 +9883,14 @@
               <a:rPr lang="en-US" sz="2400" b="1" dirty="0"/>
               <a:t> 2</a:t>
             </a:r>
+            <a:endParaRPr lang="en-US" sz="2400" b="1" dirty="0"/>
           </a:p>
         </p:txBody>
       </p:sp>
       <p:grpSp>
         <p:nvGrpSpPr>
           <p:cNvPr id="4111" name="Group 33"/>
-          <p:cNvGrpSpPr>
-            <a:grpSpLocks/>
-          </p:cNvGrpSpPr>
+          <p:cNvGrpSpPr/>
           <p:nvPr/>
         </p:nvGrpSpPr>
         <p:grpSpPr bwMode="auto">
@@ -10112,8 +9934,6 @@
             <a:ln w="57150" algn="ctr">
               <a:noFill/>
               <a:round/>
-              <a:headEnd/>
-              <a:tailEnd/>
             </a:ln>
           </p:spPr>
           <p:txBody>
@@ -10157,8 +9977,6 @@
             <a:ln w="9525" algn="ctr">
               <a:noFill/>
               <a:round/>
-              <a:headEnd/>
-              <a:tailEnd/>
             </a:ln>
           </p:spPr>
           <p:txBody>
@@ -10210,8 +10028,6 @@
             <a:ln w="38100" algn="ctr">
               <a:noFill/>
               <a:round/>
-              <a:headEnd/>
-              <a:tailEnd/>
             </a:ln>
             <a:effectLst/>
           </p:spPr>
@@ -10258,8 +10074,6 @@
             <a:ln w="38100" algn="ctr">
               <a:noFill/>
               <a:round/>
-              <a:headEnd/>
-              <a:tailEnd/>
             </a:ln>
           </p:spPr>
           <p:txBody>
@@ -10313,8 +10127,6 @@
             <a:ln w="38100" algn="ctr">
               <a:noFill/>
               <a:round/>
-              <a:headEnd/>
-              <a:tailEnd/>
             </a:ln>
             <a:effectLst/>
           </p:spPr>
@@ -10361,8 +10173,6 @@
             <a:ln w="38100" algn="ctr">
               <a:noFill/>
               <a:round/>
-              <a:headEnd/>
-              <a:tailEnd/>
             </a:ln>
           </p:spPr>
           <p:txBody>
@@ -10400,8 +10210,6 @@
               <a:schemeClr val="bg2"/>
             </a:solidFill>
             <a:round/>
-            <a:headEnd/>
-            <a:tailEnd/>
           </a:ln>
         </p:spPr>
         <p:txBody>
@@ -10452,9 +10260,7 @@
       <p:grpSp>
         <p:nvGrpSpPr>
           <p:cNvPr id="4113" name="Group 8"/>
-          <p:cNvGrpSpPr>
-            <a:grpSpLocks/>
-          </p:cNvGrpSpPr>
+          <p:cNvGrpSpPr/>
           <p:nvPr/>
         </p:nvGrpSpPr>
         <p:grpSpPr bwMode="auto">
@@ -10498,8 +10304,6 @@
             <a:ln w="57150" algn="ctr">
               <a:noFill/>
               <a:round/>
-              <a:headEnd/>
-              <a:tailEnd/>
             </a:ln>
           </p:spPr>
           <p:txBody>
@@ -10543,8 +10347,6 @@
             <a:ln w="9525" algn="ctr">
               <a:noFill/>
               <a:round/>
-              <a:headEnd/>
-              <a:tailEnd/>
             </a:ln>
           </p:spPr>
           <p:txBody>
@@ -10596,8 +10398,6 @@
             <a:ln w="38100" algn="ctr">
               <a:noFill/>
               <a:round/>
-              <a:headEnd/>
-              <a:tailEnd/>
             </a:ln>
             <a:effectLst/>
           </p:spPr>
@@ -10644,8 +10444,6 @@
             <a:ln w="38100" algn="ctr">
               <a:noFill/>
               <a:round/>
-              <a:headEnd/>
-              <a:tailEnd/>
             </a:ln>
           </p:spPr>
           <p:txBody>
@@ -10699,8 +10497,6 @@
             <a:ln w="38100" algn="ctr">
               <a:noFill/>
               <a:round/>
-              <a:headEnd/>
-              <a:tailEnd/>
             </a:ln>
             <a:effectLst/>
           </p:spPr>
@@ -10747,8 +10543,6 @@
             <a:ln w="38100" algn="ctr">
               <a:noFill/>
               <a:round/>
-              <a:headEnd/>
-              <a:tailEnd/>
             </a:ln>
           </p:spPr>
           <p:txBody>
@@ -10843,6 +10637,7 @@
               <a:rPr lang="en-US" sz="2800" dirty="0" smtClean="0"/>
               <a:t> 2</a:t>
             </a:r>
+            <a:endParaRPr lang="en-US" sz="2800" dirty="0" smtClean="0"/>
           </a:p>
         </p:txBody>
       </p:sp>
@@ -10878,6 +10673,7 @@
               <a:rPr lang="en-US" dirty="0" smtClean="0"/>
               <a:t> 2</a:t>
             </a:r>
+            <a:endParaRPr lang="en-US" dirty="0" smtClean="0"/>
           </a:p>
           <a:p>
             <a:pPr eaLnBrk="1" hangingPunct="1">
@@ -11111,6 +10907,11 @@
               </a:rPr>
               <a:t> Nachos</a:t>
             </a:r>
+            <a:endParaRPr lang="en-US" b="0" dirty="0" smtClean="0">
+              <a:solidFill>
+                <a:srgbClr val="FF0000"/>
+              </a:solidFill>
+            </a:endParaRPr>
           </a:p>
         </p:txBody>
       </p:sp>
@@ -11250,6 +11051,7 @@
               <a:rPr lang="en-US" smtClean="0"/>
               <a:t>Những phần được cung câp</a:t>
             </a:r>
+            <a:endParaRPr lang="en-US" smtClean="0"/>
           </a:p>
         </p:txBody>
       </p:sp>
@@ -11377,6 +11179,7 @@
               <a:rPr lang="en-US" dirty="0" smtClean="0"/>
               <a:t> 2</a:t>
             </a:r>
+            <a:endParaRPr lang="en-US" dirty="0" smtClean="0"/>
           </a:p>
           <a:p>
             <a:pPr lvl="1" eaLnBrk="1" hangingPunct="1"/>
@@ -11532,6 +11335,7 @@
               <a:rPr lang="en-US" dirty="0" smtClean="0"/>
               <a:t>.</a:t>
             </a:r>
+            <a:endParaRPr lang="en-US" dirty="0" smtClean="0"/>
           </a:p>
           <a:p>
             <a:pPr lvl="1" eaLnBrk="1" hangingPunct="1"/>
@@ -11728,7 +11532,7 @@
             <p:nvPr/>
           </p:nvPicPr>
           <p:blipFill>
-            <a:blip r:embed="rId2"/>
+            <a:blip r:embed="rId1"/>
             <a:stretch>
               <a:fillRect/>
             </a:stretch>
@@ -11752,7 +11556,7 @@
             <p:nvPr/>
           </p:nvPicPr>
           <p:blipFill>
-            <a:blip r:embed="rId3"/>
+            <a:blip r:embed="rId2"/>
             <a:stretch>
               <a:fillRect/>
             </a:stretch>
@@ -11861,11 +11665,6 @@
         </p:txBody>
       </p:sp>
     </p:spTree>
-    <p:extLst>
-      <p:ext uri="{BB962C8B-B14F-4D97-AF65-F5344CB8AC3E}">
-        <p14:creationId xmlns:p14="http://schemas.microsoft.com/office/powerpoint/2010/main" val="3344212716"/>
-      </p:ext>
-    </p:extLst>
   </p:cSld>
   <p:clrMapOvr>
     <a:masterClrMapping/>
@@ -12069,7 +11868,7 @@
             <p:nvPr/>
           </p:nvPicPr>
           <p:blipFill>
-            <a:blip r:embed="rId2"/>
+            <a:blip r:embed="rId1"/>
             <a:stretch>
               <a:fillRect/>
             </a:stretch>
@@ -12093,7 +11892,7 @@
             <p:nvPr/>
           </p:nvPicPr>
           <p:blipFill>
-            <a:blip r:embed="rId3"/>
+            <a:blip r:embed="rId2"/>
             <a:stretch>
               <a:fillRect/>
             </a:stretch>
@@ -12110,11 +11909,6 @@
         </p:pic>
       </p:grpSp>
     </p:spTree>
-    <p:extLst>
-      <p:ext uri="{BB962C8B-B14F-4D97-AF65-F5344CB8AC3E}">
-        <p14:creationId xmlns:p14="http://schemas.microsoft.com/office/powerpoint/2010/main" val="3688081333"/>
-      </p:ext>
-    </p:extLst>
   </p:cSld>
   <p:clrMapOvr>
     <a:masterClrMapping/>
@@ -12253,40 +12047,49 @@
             <a:pPr lvl="1"/>
             <a:r>
               <a:rPr lang="en-US" i="1" dirty="0" smtClean="0">
-                <a:sym typeface="Wingdings" pitchFamily="2" charset="2"/>
+                <a:sym typeface="Wingdings" panose="05000000000000000000" pitchFamily="2" charset="2"/>
               </a:rPr>
               <a:t>Find</a:t>
             </a:r>
+            <a:endParaRPr lang="en-US" i="1" dirty="0" smtClean="0">
+              <a:sym typeface="Wingdings" panose="05000000000000000000" pitchFamily="2" charset="2"/>
+            </a:endParaRPr>
           </a:p>
           <a:p>
             <a:pPr lvl="1"/>
             <a:r>
               <a:rPr lang="en-US" i="1" dirty="0" smtClean="0">
-                <a:sym typeface="Wingdings" pitchFamily="2" charset="2"/>
+                <a:sym typeface="Wingdings" panose="05000000000000000000" pitchFamily="2" charset="2"/>
               </a:rPr>
               <a:t>Mark</a:t>
             </a:r>
+            <a:endParaRPr lang="en-US" i="1" dirty="0" smtClean="0">
+              <a:sym typeface="Wingdings" panose="05000000000000000000" pitchFamily="2" charset="2"/>
+            </a:endParaRPr>
           </a:p>
           <a:p>
             <a:pPr lvl="1"/>
             <a:r>
               <a:rPr lang="en-US" i="1" dirty="0" smtClean="0">
-                <a:sym typeface="Wingdings" pitchFamily="2" charset="2"/>
+                <a:sym typeface="Wingdings" panose="05000000000000000000" pitchFamily="2" charset="2"/>
               </a:rPr>
               <a:t>Clear</a:t>
             </a:r>
+            <a:endParaRPr lang="en-US" i="1" dirty="0" smtClean="0">
+              <a:sym typeface="Wingdings" panose="05000000000000000000" pitchFamily="2" charset="2"/>
+            </a:endParaRPr>
           </a:p>
           <a:p>
             <a:pPr lvl="1"/>
             <a:r>
               <a:rPr lang="en-US" i="1" dirty="0" err="1" smtClean="0">
-                <a:sym typeface="Wingdings" pitchFamily="2" charset="2"/>
+                <a:sym typeface="Wingdings" panose="05000000000000000000" pitchFamily="2" charset="2"/>
               </a:rPr>
               <a:t>NumClear</a:t>
             </a:r>
             <a:r>
               <a:rPr lang="en-US" i="1" dirty="0">
-                <a:sym typeface="Wingdings" pitchFamily="2" charset="2"/>
+                <a:sym typeface="Wingdings" panose="05000000000000000000" pitchFamily="2" charset="2"/>
               </a:rPr>
               <a:t>…</a:t>
             </a:r>
@@ -12295,11 +12098,6 @@
         </p:txBody>
       </p:sp>
     </p:spTree>
-    <p:extLst>
-      <p:ext uri="{BB962C8B-B14F-4D97-AF65-F5344CB8AC3E}">
-        <p14:creationId xmlns:p14="http://schemas.microsoft.com/office/powerpoint/2010/main" val="2051441723"/>
-      </p:ext>
-    </p:extLst>
   </p:cSld>
   <p:clrMapOvr>
     <a:masterClrMapping/>
@@ -12349,31 +12147,31 @@
             <a:pPr eaLnBrk="1" hangingPunct="1"/>
             <a:r>
               <a:rPr lang="en-US" sz="2400" dirty="0" err="1" smtClean="0">
-                <a:ea typeface="新細明體" charset="-120"/>
+                <a:ea typeface="PMingLiU" charset="-120"/>
               </a:rPr>
               <a:t>Các</a:t>
             </a:r>
             <a:r>
               <a:rPr lang="en-US" sz="2400" dirty="0" smtClean="0">
-                <a:ea typeface="新細明體" charset="-120"/>
+                <a:ea typeface="PMingLiU" charset="-120"/>
               </a:rPr>
               <a:t> </a:t>
             </a:r>
             <a:r>
               <a:rPr lang="en-US" sz="2400" dirty="0" err="1" smtClean="0">
-                <a:ea typeface="新細明體" charset="-120"/>
+                <a:ea typeface="PMingLiU" charset="-120"/>
               </a:rPr>
               <a:t>Syscall</a:t>
             </a:r>
             <a:r>
               <a:rPr lang="en-US" sz="2400" dirty="0" smtClean="0">
-                <a:ea typeface="新細明體" charset="-120"/>
+                <a:ea typeface="PMingLiU" charset="-120"/>
               </a:rPr>
               <a:t> </a:t>
             </a:r>
             <a:r>
               <a:rPr lang="en-US" sz="2400" dirty="0" err="1" smtClean="0">
-                <a:ea typeface="新細明體" charset="-120"/>
+                <a:ea typeface="PMingLiU" charset="-120"/>
               </a:rPr>
               <a:t>mới</a:t>
             </a:r>
@@ -12389,11 +12187,6 @@
           </p:cNvGraphicFramePr>
           <p:nvPr>
             <p:ph idx="1"/>
-            <p:extLst>
-              <p:ext uri="{D42A27DB-BD31-4B8C-83A1-F6EECF244321}">
-                <p14:modId xmlns:p14="http://schemas.microsoft.com/office/powerpoint/2010/main" val="3369625941"/>
-              </p:ext>
-            </p:extLst>
           </p:nvPr>
         </p:nvGraphicFramePr>
         <p:xfrm>
@@ -12428,9 +12221,8 @@
                           <a:schemeClr val="hlink"/>
                         </a:buClr>
                         <a:buSzTx/>
-                        <a:buFont typeface="Wingdings" pitchFamily="2" charset="2"/>
+                        <a:buFont typeface="Wingdings" panose="05000000000000000000" pitchFamily="2" charset="2"/>
                         <a:buNone/>
-                        <a:tabLst/>
                       </a:pPr>
                       <a:r>
                         <a:rPr kumimoji="0" lang="en-US" altLang="zh-TW" sz="1600" b="1" i="0" u="none" strike="noStrike" cap="none" normalizeH="0" baseline="0" dirty="0" smtClean="0">
@@ -12441,11 +12233,22 @@
                             <a:schemeClr val="tx2"/>
                           </a:solidFill>
                           <a:effectLst/>
-                          <a:latin typeface="Verdana" pitchFamily="34" charset="0"/>
-                          <a:ea typeface="新細明體" charset="-120"/>
+                          <a:latin typeface="Verdana" panose="020B0604030504040204" pitchFamily="34" charset="0"/>
+                          <a:ea typeface="PMingLiU" charset="-120"/>
                         </a:rPr>
                         <a:t>Nachos System Call </a:t>
                       </a:r>
+                      <a:endParaRPr kumimoji="0" lang="en-US" altLang="zh-TW" sz="1600" b="1" i="0" u="none" strike="noStrike" cap="none" normalizeH="0" baseline="0" dirty="0" smtClean="0">
+                        <a:ln>
+                          <a:noFill/>
+                        </a:ln>
+                        <a:solidFill>
+                          <a:schemeClr val="tx2"/>
+                        </a:solidFill>
+                        <a:effectLst/>
+                        <a:latin typeface="Verdana" panose="020B0604030504040204" pitchFamily="34" charset="0"/>
+                        <a:ea typeface="PMingLiU" charset="-120"/>
+                      </a:endParaRPr>
                     </a:p>
                   </a:txBody>
                   <a:tcPr horzOverflow="overflow">
@@ -12513,9 +12316,8 @@
                           <a:schemeClr val="hlink"/>
                         </a:buClr>
                         <a:buSzTx/>
-                        <a:buFont typeface="Wingdings" pitchFamily="2" charset="2"/>
+                        <a:buFont typeface="Wingdings" panose="05000000000000000000" pitchFamily="2" charset="2"/>
                         <a:buNone/>
-                        <a:tabLst/>
                       </a:pPr>
                       <a:r>
                         <a:rPr kumimoji="0" lang="en-US" altLang="zh-TW" sz="1600" b="1" i="0" u="none" strike="noStrike" cap="none" normalizeH="0" baseline="0" dirty="0" smtClean="0">
@@ -12526,11 +12328,22 @@
                             <a:schemeClr val="tx2"/>
                           </a:solidFill>
                           <a:effectLst/>
-                          <a:latin typeface="Verdana" pitchFamily="34" charset="0"/>
-                          <a:ea typeface="新細明體" charset="-120"/>
+                          <a:latin typeface="Verdana" panose="020B0604030504040204" pitchFamily="34" charset="0"/>
+                          <a:ea typeface="PMingLiU" charset="-120"/>
                         </a:rPr>
                         <a:t>Nachos Functionality </a:t>
                       </a:r>
+                      <a:endParaRPr kumimoji="0" lang="en-US" altLang="zh-TW" sz="1600" b="1" i="0" u="none" strike="noStrike" cap="none" normalizeH="0" baseline="0" dirty="0" smtClean="0">
+                        <a:ln>
+                          <a:noFill/>
+                        </a:ln>
+                        <a:solidFill>
+                          <a:schemeClr val="tx2"/>
+                        </a:solidFill>
+                        <a:effectLst/>
+                        <a:latin typeface="Verdana" panose="020B0604030504040204" pitchFamily="34" charset="0"/>
+                        <a:ea typeface="PMingLiU" charset="-120"/>
+                      </a:endParaRPr>
                     </a:p>
                   </a:txBody>
                   <a:tcPr horzOverflow="overflow">
@@ -12600,9 +12413,8 @@
                           <a:schemeClr val="hlink"/>
                         </a:buClr>
                         <a:buSzTx/>
-                        <a:buFont typeface="Wingdings" pitchFamily="2" charset="2"/>
+                        <a:buFont typeface="Wingdings" panose="05000000000000000000" pitchFamily="2" charset="2"/>
                         <a:buNone/>
-                        <a:tabLst/>
                         <a:defRPr/>
                       </a:pPr>
                       <a:r>
@@ -12614,8 +12426,8 @@
                             <a:schemeClr val="tx2"/>
                           </a:solidFill>
                           <a:effectLst/>
-                          <a:latin typeface="Verdana" pitchFamily="34" charset="0"/>
-                          <a:ea typeface="新細明體" charset="-120"/>
+                          <a:latin typeface="Verdana" panose="020B0604030504040204" pitchFamily="34" charset="0"/>
+                          <a:ea typeface="PMingLiU" charset="-120"/>
                         </a:rPr>
                         <a:t>SpaceID</a:t>
                       </a:r>
@@ -12628,8 +12440,8 @@
                             <a:schemeClr val="tx2"/>
                           </a:solidFill>
                           <a:effectLst/>
-                          <a:latin typeface="Verdana" pitchFamily="34" charset="0"/>
-                          <a:ea typeface="新細明體" charset="-120"/>
+                          <a:latin typeface="Verdana" panose="020B0604030504040204" pitchFamily="34" charset="0"/>
+                          <a:ea typeface="PMingLiU" charset="-120"/>
                         </a:rPr>
                         <a:t> Exec(char *</a:t>
                       </a:r>
@@ -12642,8 +12454,8 @@
                             <a:schemeClr val="tx2"/>
                           </a:solidFill>
                           <a:effectLst/>
-                          <a:latin typeface="Verdana" pitchFamily="34" charset="0"/>
-                          <a:ea typeface="新細明體" charset="-120"/>
+                          <a:latin typeface="Verdana" panose="020B0604030504040204" pitchFamily="34" charset="0"/>
+                          <a:ea typeface="PMingLiU" charset="-120"/>
                         </a:rPr>
                         <a:t>name) </a:t>
                       </a:r>
@@ -12655,8 +12467,8 @@
                           <a:schemeClr val="tx2"/>
                         </a:solidFill>
                         <a:effectLst/>
-                        <a:latin typeface="Verdana" pitchFamily="34" charset="0"/>
-                        <a:ea typeface="新細明體" charset="-120"/>
+                        <a:latin typeface="Verdana" panose="020B0604030504040204" pitchFamily="34" charset="0"/>
+                        <a:ea typeface="PMingLiU" charset="-120"/>
                       </a:endParaRPr>
                     </a:p>
                   </a:txBody>
@@ -12725,9 +12537,8 @@
                           <a:schemeClr val="hlink"/>
                         </a:buClr>
                         <a:buSzTx/>
-                        <a:buFont typeface="Wingdings" pitchFamily="2" charset="2"/>
+                        <a:buFont typeface="Wingdings" panose="05000000000000000000" pitchFamily="2" charset="2"/>
                         <a:buNone/>
-                        <a:tabLst/>
                         <a:defRPr/>
                       </a:pPr>
                       <a:r>
@@ -12739,7 +12550,7 @@
                             <a:schemeClr val="tx2"/>
                           </a:solidFill>
                           <a:effectLst/>
-                          <a:latin typeface="Verdana" pitchFamily="34" charset="0"/>
+                          <a:latin typeface="Verdana" panose="020B0604030504040204" pitchFamily="34" charset="0"/>
                         </a:rPr>
                         <a:t>Gọi</a:t>
                       </a:r>
@@ -12752,7 +12563,7 @@
                             <a:schemeClr val="tx2"/>
                           </a:solidFill>
                           <a:effectLst/>
-                          <a:latin typeface="Verdana" pitchFamily="34" charset="0"/>
+                          <a:latin typeface="Verdana" panose="020B0604030504040204" pitchFamily="34" charset="0"/>
                         </a:rPr>
                         <a:t> </a:t>
                       </a:r>
@@ -12765,7 +12576,7 @@
                             <a:schemeClr val="tx2"/>
                           </a:solidFill>
                           <a:effectLst/>
-                          <a:latin typeface="Verdana" pitchFamily="34" charset="0"/>
+                          <a:latin typeface="Verdana" panose="020B0604030504040204" pitchFamily="34" charset="0"/>
                         </a:rPr>
                         <a:t>để</a:t>
                       </a:r>
@@ -12778,7 +12589,7 @@
                             <a:schemeClr val="tx2"/>
                           </a:solidFill>
                           <a:effectLst/>
-                          <a:latin typeface="Verdana" pitchFamily="34" charset="0"/>
+                          <a:latin typeface="Verdana" panose="020B0604030504040204" pitchFamily="34" charset="0"/>
                         </a:rPr>
                         <a:t> </a:t>
                       </a:r>
@@ -12791,7 +12602,7 @@
                             <a:schemeClr val="tx2"/>
                           </a:solidFill>
                           <a:effectLst/>
-                          <a:latin typeface="Verdana" pitchFamily="34" charset="0"/>
+                          <a:latin typeface="Verdana" panose="020B0604030504040204" pitchFamily="34" charset="0"/>
                         </a:rPr>
                         <a:t>thực</a:t>
                       </a:r>
@@ -12804,7 +12615,7 @@
                             <a:schemeClr val="tx2"/>
                           </a:solidFill>
                           <a:effectLst/>
-                          <a:latin typeface="Verdana" pitchFamily="34" charset="0"/>
+                          <a:latin typeface="Verdana" panose="020B0604030504040204" pitchFamily="34" charset="0"/>
                         </a:rPr>
                         <a:t> </a:t>
                       </a:r>
@@ -12817,7 +12628,7 @@
                             <a:schemeClr val="tx2"/>
                           </a:solidFill>
                           <a:effectLst/>
-                          <a:latin typeface="Verdana" pitchFamily="34" charset="0"/>
+                          <a:latin typeface="Verdana" panose="020B0604030504040204" pitchFamily="34" charset="0"/>
                         </a:rPr>
                         <a:t>thi</a:t>
                       </a:r>
@@ -12830,7 +12641,7 @@
                             <a:schemeClr val="tx2"/>
                           </a:solidFill>
                           <a:effectLst/>
-                          <a:latin typeface="Verdana" pitchFamily="34" charset="0"/>
+                          <a:latin typeface="Verdana" panose="020B0604030504040204" pitchFamily="34" charset="0"/>
                         </a:rPr>
                         <a:t> </a:t>
                       </a:r>
@@ -12843,7 +12654,7 @@
                             <a:schemeClr val="tx2"/>
                           </a:solidFill>
                           <a:effectLst/>
-                          <a:latin typeface="Verdana" pitchFamily="34" charset="0"/>
+                          <a:latin typeface="Verdana" panose="020B0604030504040204" pitchFamily="34" charset="0"/>
                         </a:rPr>
                         <a:t>một</a:t>
                       </a:r>
@@ -12856,10 +12667,20 @@
                             <a:schemeClr val="tx2"/>
                           </a:solidFill>
                           <a:effectLst/>
-                          <a:latin typeface="Verdana" pitchFamily="34" charset="0"/>
+                          <a:latin typeface="Verdana" panose="020B0604030504040204" pitchFamily="34" charset="0"/>
                         </a:rPr>
                         <a:t> file</a:t>
                       </a:r>
+                      <a:endParaRPr kumimoji="0" lang="en-US" sz="1600" b="1" i="0" u="none" strike="noStrike" cap="none" normalizeH="0" baseline="0" dirty="0" smtClean="0">
+                        <a:ln>
+                          <a:noFill/>
+                        </a:ln>
+                        <a:solidFill>
+                          <a:schemeClr val="tx2"/>
+                        </a:solidFill>
+                        <a:effectLst/>
+                        <a:latin typeface="Verdana" panose="020B0604030504040204" pitchFamily="34" charset="0"/>
+                      </a:endParaRPr>
                     </a:p>
                   </a:txBody>
                   <a:tcPr horzOverflow="overflow">
@@ -13045,6 +12866,7 @@
               <a:rPr lang="vi-VN" sz="2000" dirty="0"/>
               <a:t>mutex-&gt;P(); để giúp tránh tình trạng nạp 2 tiến trình cùng 1 lúc.</a:t>
             </a:r>
+            <a:endParaRPr lang="vi-VN" sz="2000" dirty="0"/>
           </a:p>
           <a:p>
             <a:pPr lvl="1"/>
@@ -13052,6 +12874,7 @@
               <a:rPr lang="vi-VN" sz="2000" dirty="0"/>
               <a:t>Kiểm tra tính hợp lệ của chương trình “name”.</a:t>
             </a:r>
+            <a:endParaRPr lang="vi-VN" sz="2000" dirty="0"/>
           </a:p>
           <a:p>
             <a:pPr lvl="1"/>
@@ -13059,6 +12882,7 @@
               <a:rPr lang="vi-VN" sz="2000" dirty="0"/>
               <a:t>Kiểm tra sự tồn tại của chương trình “name” bằng cách gọi phương thức Open của lớp fileSystem</a:t>
             </a:r>
+            <a:endParaRPr lang="vi-VN" sz="2000" dirty="0"/>
           </a:p>
           <a:p>
             <a:pPr lvl="1"/>
@@ -13066,6 +12890,7 @@
               <a:rPr lang="vi-VN" sz="2000" dirty="0"/>
               <a:t>So sánh tên chương trình và tên của currentThread để chắc chắn rằng chương trình này không gọi thực thi chính nó.</a:t>
             </a:r>
+            <a:endParaRPr lang="vi-VN" sz="2000" dirty="0"/>
           </a:p>
           <a:p>
             <a:pPr lvl="1"/>
@@ -13073,6 +12898,7 @@
               <a:rPr lang="vi-VN" sz="2000" dirty="0"/>
               <a:t>Tìm slot trống trong bảng Ptable.</a:t>
             </a:r>
+            <a:endParaRPr lang="vi-VN" sz="2000" dirty="0"/>
           </a:p>
           <a:p>
             <a:pPr lvl="1"/>
@@ -13080,6 +12906,7 @@
               <a:rPr lang="vi-VN" sz="2000" dirty="0"/>
               <a:t>Nếu có slot trống thì khởi tạo một PCB mới với processID chính là index của slot này, parrentID là processID của currentThread.</a:t>
             </a:r>
+            <a:endParaRPr lang="vi-VN" sz="2000" dirty="0"/>
           </a:p>
           <a:p>
             <a:pPr lvl="1"/>
@@ -13087,6 +12914,7 @@
               <a:rPr lang="vi-VN" sz="2000" dirty="0"/>
               <a:t>Đánh dấu đã sử dụng.</a:t>
             </a:r>
+            <a:endParaRPr lang="vi-VN" sz="2000" dirty="0"/>
           </a:p>
           <a:p>
             <a:pPr lvl="1"/>
@@ -13094,6 +12922,7 @@
               <a:rPr lang="vi-VN" sz="2000" dirty="0"/>
               <a:t>Gọi thực thi phương thức Exec của lớp PCB.</a:t>
             </a:r>
+            <a:endParaRPr lang="vi-VN" sz="2000" dirty="0"/>
           </a:p>
           <a:p>
             <a:pPr lvl="1"/>
@@ -13101,6 +12930,7 @@
               <a:rPr lang="vi-VN" sz="2000" dirty="0"/>
               <a:t>Gọi bmsem-&gt;V().</a:t>
             </a:r>
+            <a:endParaRPr lang="vi-VN" sz="2000" dirty="0"/>
           </a:p>
           <a:p>
             <a:pPr lvl="1"/>
@@ -13117,11 +12947,6 @@
         </p:txBody>
       </p:sp>
     </p:spTree>
-    <p:extLst>
-      <p:ext uri="{BB962C8B-B14F-4D97-AF65-F5344CB8AC3E}">
-        <p14:creationId xmlns:p14="http://schemas.microsoft.com/office/powerpoint/2010/main" val="2284718275"/>
-      </p:ext>
-    </p:extLst>
   </p:cSld>
   <p:clrMapOvr>
     <a:masterClrMapping/>
@@ -13356,7 +13181,6 @@
       </a:bgFillStyleLst>
     </a:fmtScheme>
   </a:themeElements>
-  <a:objectDefaults/>
   <a:extraClrSchemeLst>
     <a:extraClrScheme>
       <a:clrScheme name="sample 1">
@@ -13482,6 +13306,11 @@
       <a:clrMap bg1="lt1" tx1="dk1" bg2="lt2" tx2="dk2" accent1="accent1" accent2="accent2" accent3="accent3" accent4="accent4" accent5="accent5" accent6="accent6" hlink="hlink" folHlink="folHlink"/>
     </a:extraClrScheme>
   </a:extraClrSchemeLst>
+  <a:extLst>
+    <a:ext uri="{05A4C25C-085E-4340-85A3-A5531E510DB2}">
+      <thm15:themeFamily xmlns:thm15="http://schemas.microsoft.com/office/thememl/2012/main" name="Office Theme" id="{62F939B6-93AF-4DB8-9C6B-D6C7DFDC589F}" vid="{4A3C46E8-61CC-4603-A589-7422A47A8E4A}"/>
+    </a:ext>
+  </a:extLst>
 </a:theme>
 </file>
 
@@ -13763,7 +13592,10 @@
       </a:bgFillStyleLst>
     </a:fmtScheme>
   </a:themeElements>
-  <a:objectDefaults/>
-  <a:extraClrSchemeLst/>
+  <a:extLst>
+    <a:ext uri="{05A4C25C-085E-4340-85A3-A5531E510DB2}">
+      <thm15:themeFamily xmlns:thm15="http://schemas.microsoft.com/office/thememl/2012/main" name="Office Theme" id="{62F939B6-93AF-4DB8-9C6B-D6C7DFDC589F}" vid="{4A3C46E8-61CC-4603-A589-7422A47A8E4A}"/>
+    </a:ext>
+  </a:extLst>
 </a:theme>
 </file>
</xml_diff>